<commit_message>
after changing the implementation of the database
</commit_message>
<xml_diff>
--- a/Project Documents/IOT BRIDGE HEALTH MONITORING SYSTEM.pptx
+++ b/Project Documents/IOT BRIDGE HEALTH MONITORING SYSTEM.pptx
@@ -4,12 +4,16 @@
   <p:sldMasterIdLst>
     <p:sldMasterId id="2147483648" r:id="rId1"/>
   </p:sldMasterIdLst>
+  <p:notesMasterIdLst>
+    <p:notesMasterId r:id="rId8"/>
+  </p:notesMasterIdLst>
   <p:sldIdLst>
     <p:sldId id="256" r:id="rId2"/>
     <p:sldId id="257" r:id="rId3"/>
     <p:sldId id="258" r:id="rId4"/>
-    <p:sldId id="259" r:id="rId5"/>
-    <p:sldId id="260" r:id="rId6"/>
+    <p:sldId id="261" r:id="rId5"/>
+    <p:sldId id="259" r:id="rId6"/>
+    <p:sldId id="260" r:id="rId7"/>
   </p:sldIdLst>
   <p:sldSz cx="12192000" cy="6858000"/>
   <p:notesSz cx="6858000" cy="9144000"/>
@@ -116,6 +120,855 @@
 </p:presentation>
 </file>
 
+<file path=ppt/notesMasters/notesMaster1.xml><?xml version="1.0" encoding="utf-8"?>
+<p:notesMaster xmlns:a="http://schemas.openxmlformats.org/drawingml/2006/main" xmlns:r="http://schemas.openxmlformats.org/officeDocument/2006/relationships" xmlns:p="http://schemas.openxmlformats.org/presentationml/2006/main">
+  <p:cSld>
+    <p:bg>
+      <p:bgRef idx="1001">
+        <a:schemeClr val="bg1"/>
+      </p:bgRef>
+    </p:bg>
+    <p:spTree>
+      <p:nvGrpSpPr>
+        <p:cNvPr id="1" name=""/>
+        <p:cNvGrpSpPr/>
+        <p:nvPr/>
+      </p:nvGrpSpPr>
+      <p:grpSpPr>
+        <a:xfrm>
+          <a:off x="0" y="0"/>
+          <a:ext cx="0" cy="0"/>
+          <a:chOff x="0" y="0"/>
+          <a:chExt cx="0" cy="0"/>
+        </a:xfrm>
+      </p:grpSpPr>
+      <p:sp>
+        <p:nvSpPr>
+          <p:cNvPr id="2" name="Header Placeholder 1"/>
+          <p:cNvSpPr>
+            <a:spLocks noGrp="1"/>
+          </p:cNvSpPr>
+          <p:nvPr>
+            <p:ph type="hdr" sz="quarter"/>
+          </p:nvPr>
+        </p:nvSpPr>
+        <p:spPr>
+          <a:xfrm>
+            <a:off x="0" y="0"/>
+            <a:ext cx="2971800" cy="458788"/>
+          </a:xfrm>
+          <a:prstGeom prst="rect">
+            <a:avLst/>
+          </a:prstGeom>
+        </p:spPr>
+        <p:txBody>
+          <a:bodyPr vert="horz" lIns="91440" tIns="45720" rIns="91440" bIns="45720" rtlCol="0"/>
+          <a:lstStyle>
+            <a:lvl1pPr algn="l">
+              <a:defRPr sz="1200"/>
+            </a:lvl1pPr>
+          </a:lstStyle>
+          <a:p>
+            <a:endParaRPr lang="en-US"/>
+          </a:p>
+        </p:txBody>
+      </p:sp>
+      <p:sp>
+        <p:nvSpPr>
+          <p:cNvPr id="3" name="Date Placeholder 2"/>
+          <p:cNvSpPr>
+            <a:spLocks noGrp="1"/>
+          </p:cNvSpPr>
+          <p:nvPr>
+            <p:ph type="dt" idx="1"/>
+          </p:nvPr>
+        </p:nvSpPr>
+        <p:spPr>
+          <a:xfrm>
+            <a:off x="3884613" y="0"/>
+            <a:ext cx="2971800" cy="458788"/>
+          </a:xfrm>
+          <a:prstGeom prst="rect">
+            <a:avLst/>
+          </a:prstGeom>
+        </p:spPr>
+        <p:txBody>
+          <a:bodyPr vert="horz" lIns="91440" tIns="45720" rIns="91440" bIns="45720" rtlCol="0"/>
+          <a:lstStyle>
+            <a:lvl1pPr algn="r">
+              <a:defRPr sz="1200"/>
+            </a:lvl1pPr>
+          </a:lstStyle>
+          <a:p>
+            <a:fld id="{A5D95F22-66B1-4AF0-BFC7-A3C02BEF6C07}" type="datetimeFigureOut">
+              <a:rPr lang="en-US" smtClean="0"/>
+              <a:t>5/5/2023</a:t>
+            </a:fld>
+            <a:endParaRPr lang="en-US"/>
+          </a:p>
+        </p:txBody>
+      </p:sp>
+      <p:sp>
+        <p:nvSpPr>
+          <p:cNvPr id="4" name="Slide Image Placeholder 3"/>
+          <p:cNvSpPr>
+            <a:spLocks noGrp="1" noRot="1" noChangeAspect="1"/>
+          </p:cNvSpPr>
+          <p:nvPr>
+            <p:ph type="sldImg" idx="2"/>
+          </p:nvPr>
+        </p:nvSpPr>
+        <p:spPr>
+          <a:xfrm>
+            <a:off x="685800" y="1143000"/>
+            <a:ext cx="5486400" cy="3086100"/>
+          </a:xfrm>
+          <a:prstGeom prst="rect">
+            <a:avLst/>
+          </a:prstGeom>
+          <a:noFill/>
+          <a:ln w="12700">
+            <a:solidFill>
+              <a:prstClr val="black"/>
+            </a:solidFill>
+          </a:ln>
+        </p:spPr>
+        <p:txBody>
+          <a:bodyPr vert="horz" lIns="91440" tIns="45720" rIns="91440" bIns="45720" rtlCol="0" anchor="ctr"/>
+          <a:lstStyle/>
+          <a:p>
+            <a:endParaRPr lang="en-US"/>
+          </a:p>
+        </p:txBody>
+      </p:sp>
+      <p:sp>
+        <p:nvSpPr>
+          <p:cNvPr id="5" name="Notes Placeholder 4"/>
+          <p:cNvSpPr>
+            <a:spLocks noGrp="1"/>
+          </p:cNvSpPr>
+          <p:nvPr>
+            <p:ph type="body" sz="quarter" idx="3"/>
+          </p:nvPr>
+        </p:nvSpPr>
+        <p:spPr>
+          <a:xfrm>
+            <a:off x="685800" y="4400550"/>
+            <a:ext cx="5486400" cy="3600450"/>
+          </a:xfrm>
+          <a:prstGeom prst="rect">
+            <a:avLst/>
+          </a:prstGeom>
+        </p:spPr>
+        <p:txBody>
+          <a:bodyPr vert="horz" lIns="91440" tIns="45720" rIns="91440" bIns="45720" rtlCol="0"/>
+          <a:lstStyle/>
+          <a:p>
+            <a:pPr lvl="0"/>
+            <a:r>
+              <a:rPr lang="en-US" smtClean="0"/>
+              <a:t>Click to edit Master text styles</a:t>
+            </a:r>
+          </a:p>
+          <a:p>
+            <a:pPr lvl="1"/>
+            <a:r>
+              <a:rPr lang="en-US" smtClean="0"/>
+              <a:t>Second level</a:t>
+            </a:r>
+          </a:p>
+          <a:p>
+            <a:pPr lvl="2"/>
+            <a:r>
+              <a:rPr lang="en-US" smtClean="0"/>
+              <a:t>Third level</a:t>
+            </a:r>
+          </a:p>
+          <a:p>
+            <a:pPr lvl="3"/>
+            <a:r>
+              <a:rPr lang="en-US" smtClean="0"/>
+              <a:t>Fourth level</a:t>
+            </a:r>
+          </a:p>
+          <a:p>
+            <a:pPr lvl="4"/>
+            <a:r>
+              <a:rPr lang="en-US" smtClean="0"/>
+              <a:t>Fifth level</a:t>
+            </a:r>
+            <a:endParaRPr lang="en-US"/>
+          </a:p>
+        </p:txBody>
+      </p:sp>
+      <p:sp>
+        <p:nvSpPr>
+          <p:cNvPr id="6" name="Footer Placeholder 5"/>
+          <p:cNvSpPr>
+            <a:spLocks noGrp="1"/>
+          </p:cNvSpPr>
+          <p:nvPr>
+            <p:ph type="ftr" sz="quarter" idx="4"/>
+          </p:nvPr>
+        </p:nvSpPr>
+        <p:spPr>
+          <a:xfrm>
+            <a:off x="0" y="8685213"/>
+            <a:ext cx="2971800" cy="458787"/>
+          </a:xfrm>
+          <a:prstGeom prst="rect">
+            <a:avLst/>
+          </a:prstGeom>
+        </p:spPr>
+        <p:txBody>
+          <a:bodyPr vert="horz" lIns="91440" tIns="45720" rIns="91440" bIns="45720" rtlCol="0" anchor="b"/>
+          <a:lstStyle>
+            <a:lvl1pPr algn="l">
+              <a:defRPr sz="1200"/>
+            </a:lvl1pPr>
+          </a:lstStyle>
+          <a:p>
+            <a:endParaRPr lang="en-US"/>
+          </a:p>
+        </p:txBody>
+      </p:sp>
+      <p:sp>
+        <p:nvSpPr>
+          <p:cNvPr id="7" name="Slide Number Placeholder 6"/>
+          <p:cNvSpPr>
+            <a:spLocks noGrp="1"/>
+          </p:cNvSpPr>
+          <p:nvPr>
+            <p:ph type="sldNum" sz="quarter" idx="5"/>
+          </p:nvPr>
+        </p:nvSpPr>
+        <p:spPr>
+          <a:xfrm>
+            <a:off x="3884613" y="8685213"/>
+            <a:ext cx="2971800" cy="458787"/>
+          </a:xfrm>
+          <a:prstGeom prst="rect">
+            <a:avLst/>
+          </a:prstGeom>
+        </p:spPr>
+        <p:txBody>
+          <a:bodyPr vert="horz" lIns="91440" tIns="45720" rIns="91440" bIns="45720" rtlCol="0" anchor="b"/>
+          <a:lstStyle>
+            <a:lvl1pPr algn="r">
+              <a:defRPr sz="1200"/>
+            </a:lvl1pPr>
+          </a:lstStyle>
+          <a:p>
+            <a:fld id="{A45837CD-F375-46AB-AB47-CE56D837565E}" type="slidenum">
+              <a:rPr lang="en-US" smtClean="0"/>
+              <a:t>‹#›</a:t>
+            </a:fld>
+            <a:endParaRPr lang="en-US"/>
+          </a:p>
+        </p:txBody>
+      </p:sp>
+    </p:spTree>
+    <p:extLst>
+      <p:ext uri="{BB962C8B-B14F-4D97-AF65-F5344CB8AC3E}">
+        <p14:creationId xmlns:p14="http://schemas.microsoft.com/office/powerpoint/2010/main" val="948841811"/>
+      </p:ext>
+    </p:extLst>
+  </p:cSld>
+  <p:clrMap bg1="lt1" tx1="dk1" bg2="lt2" tx2="dk2" accent1="accent1" accent2="accent2" accent3="accent3" accent4="accent4" accent5="accent5" accent6="accent6" hlink="hlink" folHlink="folHlink"/>
+  <p:notesStyle>
+    <a:lvl1pPr marL="0" algn="l" defTabSz="914400" rtl="0" eaLnBrk="1" latinLnBrk="0" hangingPunct="1">
+      <a:defRPr sz="1200" kern="1200">
+        <a:solidFill>
+          <a:schemeClr val="tx1"/>
+        </a:solidFill>
+        <a:latin typeface="+mn-lt"/>
+        <a:ea typeface="+mn-ea"/>
+        <a:cs typeface="+mn-cs"/>
+      </a:defRPr>
+    </a:lvl1pPr>
+    <a:lvl2pPr marL="457200" algn="l" defTabSz="914400" rtl="0" eaLnBrk="1" latinLnBrk="0" hangingPunct="1">
+      <a:defRPr sz="1200" kern="1200">
+        <a:solidFill>
+          <a:schemeClr val="tx1"/>
+        </a:solidFill>
+        <a:latin typeface="+mn-lt"/>
+        <a:ea typeface="+mn-ea"/>
+        <a:cs typeface="+mn-cs"/>
+      </a:defRPr>
+    </a:lvl2pPr>
+    <a:lvl3pPr marL="914400" algn="l" defTabSz="914400" rtl="0" eaLnBrk="1" latinLnBrk="0" hangingPunct="1">
+      <a:defRPr sz="1200" kern="1200">
+        <a:solidFill>
+          <a:schemeClr val="tx1"/>
+        </a:solidFill>
+        <a:latin typeface="+mn-lt"/>
+        <a:ea typeface="+mn-ea"/>
+        <a:cs typeface="+mn-cs"/>
+      </a:defRPr>
+    </a:lvl3pPr>
+    <a:lvl4pPr marL="1371600" algn="l" defTabSz="914400" rtl="0" eaLnBrk="1" latinLnBrk="0" hangingPunct="1">
+      <a:defRPr sz="1200" kern="1200">
+        <a:solidFill>
+          <a:schemeClr val="tx1"/>
+        </a:solidFill>
+        <a:latin typeface="+mn-lt"/>
+        <a:ea typeface="+mn-ea"/>
+        <a:cs typeface="+mn-cs"/>
+      </a:defRPr>
+    </a:lvl4pPr>
+    <a:lvl5pPr marL="1828800" algn="l" defTabSz="914400" rtl="0" eaLnBrk="1" latinLnBrk="0" hangingPunct="1">
+      <a:defRPr sz="1200" kern="1200">
+        <a:solidFill>
+          <a:schemeClr val="tx1"/>
+        </a:solidFill>
+        <a:latin typeface="+mn-lt"/>
+        <a:ea typeface="+mn-ea"/>
+        <a:cs typeface="+mn-cs"/>
+      </a:defRPr>
+    </a:lvl5pPr>
+    <a:lvl6pPr marL="2286000" algn="l" defTabSz="914400" rtl="0" eaLnBrk="1" latinLnBrk="0" hangingPunct="1">
+      <a:defRPr sz="1200" kern="1200">
+        <a:solidFill>
+          <a:schemeClr val="tx1"/>
+        </a:solidFill>
+        <a:latin typeface="+mn-lt"/>
+        <a:ea typeface="+mn-ea"/>
+        <a:cs typeface="+mn-cs"/>
+      </a:defRPr>
+    </a:lvl6pPr>
+    <a:lvl7pPr marL="2743200" algn="l" defTabSz="914400" rtl="0" eaLnBrk="1" latinLnBrk="0" hangingPunct="1">
+      <a:defRPr sz="1200" kern="1200">
+        <a:solidFill>
+          <a:schemeClr val="tx1"/>
+        </a:solidFill>
+        <a:latin typeface="+mn-lt"/>
+        <a:ea typeface="+mn-ea"/>
+        <a:cs typeface="+mn-cs"/>
+      </a:defRPr>
+    </a:lvl7pPr>
+    <a:lvl8pPr marL="3200400" algn="l" defTabSz="914400" rtl="0" eaLnBrk="1" latinLnBrk="0" hangingPunct="1">
+      <a:defRPr sz="1200" kern="1200">
+        <a:solidFill>
+          <a:schemeClr val="tx1"/>
+        </a:solidFill>
+        <a:latin typeface="+mn-lt"/>
+        <a:ea typeface="+mn-ea"/>
+        <a:cs typeface="+mn-cs"/>
+      </a:defRPr>
+    </a:lvl8pPr>
+    <a:lvl9pPr marL="3657600" algn="l" defTabSz="914400" rtl="0" eaLnBrk="1" latinLnBrk="0" hangingPunct="1">
+      <a:defRPr sz="1200" kern="1200">
+        <a:solidFill>
+          <a:schemeClr val="tx1"/>
+        </a:solidFill>
+        <a:latin typeface="+mn-lt"/>
+        <a:ea typeface="+mn-ea"/>
+        <a:cs typeface="+mn-cs"/>
+      </a:defRPr>
+    </a:lvl9pPr>
+  </p:notesStyle>
+</p:notesMaster>
+</file>
+
+<file path=ppt/notesSlides/notesSlide1.xml><?xml version="1.0" encoding="utf-8"?>
+<p:notes xmlns:a="http://schemas.openxmlformats.org/drawingml/2006/main" xmlns:r="http://schemas.openxmlformats.org/officeDocument/2006/relationships" xmlns:p="http://schemas.openxmlformats.org/presentationml/2006/main">
+  <p:cSld>
+    <p:spTree>
+      <p:nvGrpSpPr>
+        <p:cNvPr id="1" name=""/>
+        <p:cNvGrpSpPr/>
+        <p:nvPr/>
+      </p:nvGrpSpPr>
+      <p:grpSpPr>
+        <a:xfrm>
+          <a:off x="0" y="0"/>
+          <a:ext cx="0" cy="0"/>
+          <a:chOff x="0" y="0"/>
+          <a:chExt cx="0" cy="0"/>
+        </a:xfrm>
+      </p:grpSpPr>
+      <p:sp>
+        <p:nvSpPr>
+          <p:cNvPr id="2" name="Slide Image Placeholder 1"/>
+          <p:cNvSpPr>
+            <a:spLocks noGrp="1" noRot="1" noChangeAspect="1"/>
+          </p:cNvSpPr>
+          <p:nvPr>
+            <p:ph type="sldImg"/>
+          </p:nvPr>
+        </p:nvSpPr>
+        <p:spPr/>
+      </p:sp>
+      <p:sp>
+        <p:nvSpPr>
+          <p:cNvPr id="3" name="Notes Placeholder 2"/>
+          <p:cNvSpPr>
+            <a:spLocks noGrp="1"/>
+          </p:cNvSpPr>
+          <p:nvPr>
+            <p:ph type="body" idx="1"/>
+          </p:nvPr>
+        </p:nvSpPr>
+        <p:spPr/>
+        <p:txBody>
+          <a:bodyPr/>
+          <a:lstStyle/>
+          <a:p>
+            <a:r>
+              <a:rPr lang="en-US" dirty="0" smtClean="0"/>
+              <a:t>For</a:t>
+            </a:r>
+            <a:r>
+              <a:rPr lang="en-US" baseline="0" dirty="0" smtClean="0"/>
+              <a:t> example, this year we have experienced cases like:  the M2 Peter Muthalika road bridge which was damaged due to incessant(</a:t>
+            </a:r>
+            <a:r>
+              <a:rPr lang="en-US" baseline="0" dirty="0" err="1" smtClean="0"/>
+              <a:t>continuos</a:t>
+            </a:r>
+            <a:r>
+              <a:rPr lang="en-US" baseline="0" dirty="0" smtClean="0"/>
+              <a:t>)  rains, </a:t>
+            </a:r>
+            <a:endParaRPr lang="en-US" baseline="0" dirty="0" smtClean="0"/>
+          </a:p>
+          <a:p>
+            <a:r>
+              <a:rPr lang="en-US" sz="1200" kern="1200" dirty="0" err="1" smtClean="0">
+                <a:solidFill>
+                  <a:schemeClr val="tx1"/>
+                </a:solidFill>
+                <a:effectLst/>
+                <a:latin typeface="+mn-lt"/>
+                <a:ea typeface="+mn-ea"/>
+                <a:cs typeface="+mn-cs"/>
+              </a:rPr>
+              <a:t>Lisungwi</a:t>
+            </a:r>
+            <a:r>
+              <a:rPr lang="en-US" sz="1200" kern="1200" dirty="0" smtClean="0">
+                <a:solidFill>
+                  <a:schemeClr val="tx1"/>
+                </a:solidFill>
+                <a:effectLst/>
+                <a:latin typeface="+mn-lt"/>
+                <a:ea typeface="+mn-ea"/>
+                <a:cs typeface="+mn-cs"/>
+              </a:rPr>
+              <a:t> </a:t>
+            </a:r>
+            <a:r>
+              <a:rPr lang="en-US" sz="1200" kern="1200" dirty="0" smtClean="0">
+                <a:solidFill>
+                  <a:schemeClr val="tx1"/>
+                </a:solidFill>
+                <a:effectLst/>
+                <a:latin typeface="+mn-lt"/>
+                <a:ea typeface="+mn-ea"/>
+                <a:cs typeface="+mn-cs"/>
+              </a:rPr>
+              <a:t>bridge damaged due to vibrations caused by cyclones and also two people were washed away together with the bridge in </a:t>
+            </a:r>
+            <a:r>
+              <a:rPr lang="en-US" sz="1200" kern="1200" dirty="0" err="1" smtClean="0">
+                <a:solidFill>
+                  <a:schemeClr val="tx1"/>
+                </a:solidFill>
+                <a:effectLst/>
+                <a:latin typeface="+mn-lt"/>
+                <a:ea typeface="+mn-ea"/>
+                <a:cs typeface="+mn-cs"/>
+              </a:rPr>
+              <a:t>Machinjiri</a:t>
+            </a:r>
+            <a:r>
+              <a:rPr lang="en-US" sz="1200" kern="1200" dirty="0" smtClean="0">
+                <a:solidFill>
+                  <a:schemeClr val="tx1"/>
+                </a:solidFill>
+                <a:effectLst/>
+                <a:latin typeface="+mn-lt"/>
+                <a:ea typeface="+mn-ea"/>
+                <a:cs typeface="+mn-cs"/>
+              </a:rPr>
+              <a:t> due to raging rains.</a:t>
+            </a:r>
+            <a:endParaRPr lang="en-US" baseline="0" dirty="0" smtClean="0"/>
+          </a:p>
+        </p:txBody>
+      </p:sp>
+      <p:sp>
+        <p:nvSpPr>
+          <p:cNvPr id="4" name="Slide Number Placeholder 3"/>
+          <p:cNvSpPr>
+            <a:spLocks noGrp="1"/>
+          </p:cNvSpPr>
+          <p:nvPr>
+            <p:ph type="sldNum" sz="quarter" idx="10"/>
+          </p:nvPr>
+        </p:nvSpPr>
+        <p:spPr/>
+        <p:txBody>
+          <a:bodyPr/>
+          <a:lstStyle/>
+          <a:p>
+            <a:fld id="{A45837CD-F375-46AB-AB47-CE56D837565E}" type="slidenum">
+              <a:rPr lang="en-US" smtClean="0"/>
+              <a:t>2</a:t>
+            </a:fld>
+            <a:endParaRPr lang="en-US"/>
+          </a:p>
+        </p:txBody>
+      </p:sp>
+    </p:spTree>
+    <p:extLst>
+      <p:ext uri="{BB962C8B-B14F-4D97-AF65-F5344CB8AC3E}">
+        <p14:creationId xmlns:p14="http://schemas.microsoft.com/office/powerpoint/2010/main" val="1042689692"/>
+      </p:ext>
+    </p:extLst>
+  </p:cSld>
+  <p:clrMapOvr>
+    <a:masterClrMapping/>
+  </p:clrMapOvr>
+</p:notes>
+</file>
+
+<file path=ppt/notesSlides/notesSlide2.xml><?xml version="1.0" encoding="utf-8"?>
+<p:notes xmlns:a="http://schemas.openxmlformats.org/drawingml/2006/main" xmlns:r="http://schemas.openxmlformats.org/officeDocument/2006/relationships" xmlns:p="http://schemas.openxmlformats.org/presentationml/2006/main">
+  <p:cSld>
+    <p:spTree>
+      <p:nvGrpSpPr>
+        <p:cNvPr id="1" name=""/>
+        <p:cNvGrpSpPr/>
+        <p:nvPr/>
+      </p:nvGrpSpPr>
+      <p:grpSpPr>
+        <a:xfrm>
+          <a:off x="0" y="0"/>
+          <a:ext cx="0" cy="0"/>
+          <a:chOff x="0" y="0"/>
+          <a:chExt cx="0" cy="0"/>
+        </a:xfrm>
+      </p:grpSpPr>
+      <p:sp>
+        <p:nvSpPr>
+          <p:cNvPr id="2" name="Slide Image Placeholder 1"/>
+          <p:cNvSpPr>
+            <a:spLocks noGrp="1" noRot="1" noChangeAspect="1"/>
+          </p:cNvSpPr>
+          <p:nvPr>
+            <p:ph type="sldImg"/>
+          </p:nvPr>
+        </p:nvSpPr>
+        <p:spPr/>
+      </p:sp>
+      <p:sp>
+        <p:nvSpPr>
+          <p:cNvPr id="3" name="Notes Placeholder 2"/>
+          <p:cNvSpPr>
+            <a:spLocks noGrp="1"/>
+          </p:cNvSpPr>
+          <p:nvPr>
+            <p:ph type="body" idx="1"/>
+          </p:nvPr>
+        </p:nvSpPr>
+        <p:spPr/>
+        <p:txBody>
+          <a:bodyPr/>
+          <a:lstStyle/>
+          <a:p>
+            <a:endParaRPr lang="en-US" dirty="0"/>
+          </a:p>
+        </p:txBody>
+      </p:sp>
+      <p:sp>
+        <p:nvSpPr>
+          <p:cNvPr id="4" name="Slide Number Placeholder 3"/>
+          <p:cNvSpPr>
+            <a:spLocks noGrp="1"/>
+          </p:cNvSpPr>
+          <p:nvPr>
+            <p:ph type="sldNum" sz="quarter" idx="10"/>
+          </p:nvPr>
+        </p:nvSpPr>
+        <p:spPr/>
+        <p:txBody>
+          <a:bodyPr/>
+          <a:lstStyle/>
+          <a:p>
+            <a:fld id="{A45837CD-F375-46AB-AB47-CE56D837565E}" type="slidenum">
+              <a:rPr lang="en-US" smtClean="0"/>
+              <a:t>3</a:t>
+            </a:fld>
+            <a:endParaRPr lang="en-US"/>
+          </a:p>
+        </p:txBody>
+      </p:sp>
+    </p:spTree>
+    <p:extLst>
+      <p:ext uri="{BB962C8B-B14F-4D97-AF65-F5344CB8AC3E}">
+        <p14:creationId xmlns:p14="http://schemas.microsoft.com/office/powerpoint/2010/main" val="3190973371"/>
+      </p:ext>
+    </p:extLst>
+  </p:cSld>
+  <p:clrMapOvr>
+    <a:masterClrMapping/>
+  </p:clrMapOvr>
+</p:notes>
+</file>
+
+<file path=ppt/notesSlides/notesSlide3.xml><?xml version="1.0" encoding="utf-8"?>
+<p:notes xmlns:a="http://schemas.openxmlformats.org/drawingml/2006/main" xmlns:r="http://schemas.openxmlformats.org/officeDocument/2006/relationships" xmlns:p="http://schemas.openxmlformats.org/presentationml/2006/main">
+  <p:cSld>
+    <p:spTree>
+      <p:nvGrpSpPr>
+        <p:cNvPr id="1" name=""/>
+        <p:cNvGrpSpPr/>
+        <p:nvPr/>
+      </p:nvGrpSpPr>
+      <p:grpSpPr>
+        <a:xfrm>
+          <a:off x="0" y="0"/>
+          <a:ext cx="0" cy="0"/>
+          <a:chOff x="0" y="0"/>
+          <a:chExt cx="0" cy="0"/>
+        </a:xfrm>
+      </p:grpSpPr>
+      <p:sp>
+        <p:nvSpPr>
+          <p:cNvPr id="2" name="Slide Image Placeholder 1"/>
+          <p:cNvSpPr>
+            <a:spLocks noGrp="1" noRot="1" noChangeAspect="1"/>
+          </p:cNvSpPr>
+          <p:nvPr>
+            <p:ph type="sldImg"/>
+          </p:nvPr>
+        </p:nvSpPr>
+        <p:spPr/>
+      </p:sp>
+      <p:sp>
+        <p:nvSpPr>
+          <p:cNvPr id="3" name="Notes Placeholder 2"/>
+          <p:cNvSpPr>
+            <a:spLocks noGrp="1"/>
+          </p:cNvSpPr>
+          <p:nvPr>
+            <p:ph type="body" idx="1"/>
+          </p:nvPr>
+        </p:nvSpPr>
+        <p:spPr/>
+        <p:txBody>
+          <a:bodyPr/>
+          <a:lstStyle/>
+          <a:p>
+            <a:endParaRPr lang="en-US" dirty="0"/>
+          </a:p>
+        </p:txBody>
+      </p:sp>
+      <p:sp>
+        <p:nvSpPr>
+          <p:cNvPr id="4" name="Slide Number Placeholder 3"/>
+          <p:cNvSpPr>
+            <a:spLocks noGrp="1"/>
+          </p:cNvSpPr>
+          <p:nvPr>
+            <p:ph type="sldNum" sz="quarter" idx="10"/>
+          </p:nvPr>
+        </p:nvSpPr>
+        <p:spPr/>
+        <p:txBody>
+          <a:bodyPr/>
+          <a:lstStyle/>
+          <a:p>
+            <a:fld id="{A45837CD-F375-46AB-AB47-CE56D837565E}" type="slidenum">
+              <a:rPr lang="en-US" smtClean="0"/>
+              <a:t>4</a:t>
+            </a:fld>
+            <a:endParaRPr lang="en-US"/>
+          </a:p>
+        </p:txBody>
+      </p:sp>
+    </p:spTree>
+    <p:extLst>
+      <p:ext uri="{BB962C8B-B14F-4D97-AF65-F5344CB8AC3E}">
+        <p14:creationId xmlns:p14="http://schemas.microsoft.com/office/powerpoint/2010/main" val="4252074889"/>
+      </p:ext>
+    </p:extLst>
+  </p:cSld>
+  <p:clrMapOvr>
+    <a:masterClrMapping/>
+  </p:clrMapOvr>
+</p:notes>
+</file>
+
+<file path=ppt/notesSlides/notesSlide4.xml><?xml version="1.0" encoding="utf-8"?>
+<p:notes xmlns:a="http://schemas.openxmlformats.org/drawingml/2006/main" xmlns:r="http://schemas.openxmlformats.org/officeDocument/2006/relationships" xmlns:p="http://schemas.openxmlformats.org/presentationml/2006/main">
+  <p:cSld>
+    <p:spTree>
+      <p:nvGrpSpPr>
+        <p:cNvPr id="1" name=""/>
+        <p:cNvGrpSpPr/>
+        <p:nvPr/>
+      </p:nvGrpSpPr>
+      <p:grpSpPr>
+        <a:xfrm>
+          <a:off x="0" y="0"/>
+          <a:ext cx="0" cy="0"/>
+          <a:chOff x="0" y="0"/>
+          <a:chExt cx="0" cy="0"/>
+        </a:xfrm>
+      </p:grpSpPr>
+      <p:sp>
+        <p:nvSpPr>
+          <p:cNvPr id="2" name="Slide Image Placeholder 1"/>
+          <p:cNvSpPr>
+            <a:spLocks noGrp="1" noRot="1" noChangeAspect="1"/>
+          </p:cNvSpPr>
+          <p:nvPr>
+            <p:ph type="sldImg"/>
+          </p:nvPr>
+        </p:nvSpPr>
+        <p:spPr/>
+      </p:sp>
+      <p:sp>
+        <p:nvSpPr>
+          <p:cNvPr id="3" name="Notes Placeholder 2"/>
+          <p:cNvSpPr>
+            <a:spLocks noGrp="1"/>
+          </p:cNvSpPr>
+          <p:nvPr>
+            <p:ph type="body" idx="1"/>
+          </p:nvPr>
+        </p:nvSpPr>
+        <p:spPr/>
+        <p:txBody>
+          <a:bodyPr/>
+          <a:lstStyle/>
+          <a:p>
+            <a:endParaRPr lang="en-US"/>
+          </a:p>
+        </p:txBody>
+      </p:sp>
+      <p:sp>
+        <p:nvSpPr>
+          <p:cNvPr id="4" name="Slide Number Placeholder 3"/>
+          <p:cNvSpPr>
+            <a:spLocks noGrp="1"/>
+          </p:cNvSpPr>
+          <p:nvPr>
+            <p:ph type="sldNum" sz="quarter" idx="10"/>
+          </p:nvPr>
+        </p:nvSpPr>
+        <p:spPr/>
+        <p:txBody>
+          <a:bodyPr/>
+          <a:lstStyle/>
+          <a:p>
+            <a:fld id="{A45837CD-F375-46AB-AB47-CE56D837565E}" type="slidenum">
+              <a:rPr lang="en-US" smtClean="0"/>
+              <a:t>5</a:t>
+            </a:fld>
+            <a:endParaRPr lang="en-US"/>
+          </a:p>
+        </p:txBody>
+      </p:sp>
+    </p:spTree>
+    <p:extLst>
+      <p:ext uri="{BB962C8B-B14F-4D97-AF65-F5344CB8AC3E}">
+        <p14:creationId xmlns:p14="http://schemas.microsoft.com/office/powerpoint/2010/main" val="1099985590"/>
+      </p:ext>
+    </p:extLst>
+  </p:cSld>
+  <p:clrMapOvr>
+    <a:masterClrMapping/>
+  </p:clrMapOvr>
+</p:notes>
+</file>
+
+<file path=ppt/notesSlides/notesSlide5.xml><?xml version="1.0" encoding="utf-8"?>
+<p:notes xmlns:a="http://schemas.openxmlformats.org/drawingml/2006/main" xmlns:r="http://schemas.openxmlformats.org/officeDocument/2006/relationships" xmlns:p="http://schemas.openxmlformats.org/presentationml/2006/main">
+  <p:cSld>
+    <p:spTree>
+      <p:nvGrpSpPr>
+        <p:cNvPr id="1" name=""/>
+        <p:cNvGrpSpPr/>
+        <p:nvPr/>
+      </p:nvGrpSpPr>
+      <p:grpSpPr>
+        <a:xfrm>
+          <a:off x="0" y="0"/>
+          <a:ext cx="0" cy="0"/>
+          <a:chOff x="0" y="0"/>
+          <a:chExt cx="0" cy="0"/>
+        </a:xfrm>
+      </p:grpSpPr>
+      <p:sp>
+        <p:nvSpPr>
+          <p:cNvPr id="2" name="Slide Image Placeholder 1"/>
+          <p:cNvSpPr>
+            <a:spLocks noGrp="1" noRot="1" noChangeAspect="1"/>
+          </p:cNvSpPr>
+          <p:nvPr>
+            <p:ph type="sldImg"/>
+          </p:nvPr>
+        </p:nvSpPr>
+        <p:spPr/>
+      </p:sp>
+      <p:sp>
+        <p:nvSpPr>
+          <p:cNvPr id="3" name="Notes Placeholder 2"/>
+          <p:cNvSpPr>
+            <a:spLocks noGrp="1"/>
+          </p:cNvSpPr>
+          <p:nvPr>
+            <p:ph type="body" idx="1"/>
+          </p:nvPr>
+        </p:nvSpPr>
+        <p:spPr/>
+        <p:txBody>
+          <a:bodyPr/>
+          <a:lstStyle/>
+          <a:p>
+            <a:endParaRPr lang="en-US" dirty="0"/>
+          </a:p>
+        </p:txBody>
+      </p:sp>
+      <p:sp>
+        <p:nvSpPr>
+          <p:cNvPr id="4" name="Slide Number Placeholder 3"/>
+          <p:cNvSpPr>
+            <a:spLocks noGrp="1"/>
+          </p:cNvSpPr>
+          <p:nvPr>
+            <p:ph type="sldNum" sz="quarter" idx="10"/>
+          </p:nvPr>
+        </p:nvSpPr>
+        <p:spPr/>
+        <p:txBody>
+          <a:bodyPr/>
+          <a:lstStyle/>
+          <a:p>
+            <a:fld id="{A45837CD-F375-46AB-AB47-CE56D837565E}" type="slidenum">
+              <a:rPr lang="en-US" smtClean="0"/>
+              <a:t>6</a:t>
+            </a:fld>
+            <a:endParaRPr lang="en-US"/>
+          </a:p>
+        </p:txBody>
+      </p:sp>
+    </p:spTree>
+    <p:extLst>
+      <p:ext uri="{BB962C8B-B14F-4D97-AF65-F5344CB8AC3E}">
+        <p14:creationId xmlns:p14="http://schemas.microsoft.com/office/powerpoint/2010/main" val="2066201437"/>
+      </p:ext>
+    </p:extLst>
+  </p:cSld>
+  <p:clrMapOvr>
+    <a:masterClrMapping/>
+  </p:clrMapOvr>
+</p:notes>
+</file>
+
 <file path=ppt/slideLayouts/slideLayout1.xml><?xml version="1.0" encoding="utf-8"?>
 <p:sldLayout xmlns:a="http://schemas.openxmlformats.org/drawingml/2006/main" xmlns:r="http://schemas.openxmlformats.org/officeDocument/2006/relationships" xmlns:p="http://schemas.openxmlformats.org/presentationml/2006/main" type="title" preserve="1">
   <p:cSld name="Title Slide">
@@ -263,7 +1116,7 @@
           <a:p>
             <a:fld id="{DC56E06E-BEA2-4DD1-80C0-67F9D1558EE0}" type="datetimeFigureOut">
               <a:rPr lang="en-US" smtClean="0"/>
-              <a:t>5/4/2023</a:t>
+              <a:t>5/5/2023</a:t>
             </a:fld>
             <a:endParaRPr lang="en-US"/>
           </a:p>
@@ -461,7 +1314,7 @@
           <a:p>
             <a:fld id="{DC56E06E-BEA2-4DD1-80C0-67F9D1558EE0}" type="datetimeFigureOut">
               <a:rPr lang="en-US" smtClean="0"/>
-              <a:t>5/4/2023</a:t>
+              <a:t>5/5/2023</a:t>
             </a:fld>
             <a:endParaRPr lang="en-US"/>
           </a:p>
@@ -669,7 +1522,7 @@
           <a:p>
             <a:fld id="{DC56E06E-BEA2-4DD1-80C0-67F9D1558EE0}" type="datetimeFigureOut">
               <a:rPr lang="en-US" smtClean="0"/>
-              <a:t>5/4/2023</a:t>
+              <a:t>5/5/2023</a:t>
             </a:fld>
             <a:endParaRPr lang="en-US"/>
           </a:p>
@@ -867,7 +1720,7 @@
           <a:p>
             <a:fld id="{DC56E06E-BEA2-4DD1-80C0-67F9D1558EE0}" type="datetimeFigureOut">
               <a:rPr lang="en-US" smtClean="0"/>
-              <a:t>5/4/2023</a:t>
+              <a:t>5/5/2023</a:t>
             </a:fld>
             <a:endParaRPr lang="en-US"/>
           </a:p>
@@ -1142,7 +1995,7 @@
           <a:p>
             <a:fld id="{DC56E06E-BEA2-4DD1-80C0-67F9D1558EE0}" type="datetimeFigureOut">
               <a:rPr lang="en-US" smtClean="0"/>
-              <a:t>5/4/2023</a:t>
+              <a:t>5/5/2023</a:t>
             </a:fld>
             <a:endParaRPr lang="en-US"/>
           </a:p>
@@ -1407,7 +2260,7 @@
           <a:p>
             <a:fld id="{DC56E06E-BEA2-4DD1-80C0-67F9D1558EE0}" type="datetimeFigureOut">
               <a:rPr lang="en-US" smtClean="0"/>
-              <a:t>5/4/2023</a:t>
+              <a:t>5/5/2023</a:t>
             </a:fld>
             <a:endParaRPr lang="en-US"/>
           </a:p>
@@ -1819,7 +2672,7 @@
           <a:p>
             <a:fld id="{DC56E06E-BEA2-4DD1-80C0-67F9D1558EE0}" type="datetimeFigureOut">
               <a:rPr lang="en-US" smtClean="0"/>
-              <a:t>5/4/2023</a:t>
+              <a:t>5/5/2023</a:t>
             </a:fld>
             <a:endParaRPr lang="en-US"/>
           </a:p>
@@ -1960,7 +2813,7 @@
           <a:p>
             <a:fld id="{DC56E06E-BEA2-4DD1-80C0-67F9D1558EE0}" type="datetimeFigureOut">
               <a:rPr lang="en-US" smtClean="0"/>
-              <a:t>5/4/2023</a:t>
+              <a:t>5/5/2023</a:t>
             </a:fld>
             <a:endParaRPr lang="en-US"/>
           </a:p>
@@ -2073,7 +2926,7 @@
           <a:p>
             <a:fld id="{DC56E06E-BEA2-4DD1-80C0-67F9D1558EE0}" type="datetimeFigureOut">
               <a:rPr lang="en-US" smtClean="0"/>
-              <a:t>5/4/2023</a:t>
+              <a:t>5/5/2023</a:t>
             </a:fld>
             <a:endParaRPr lang="en-US"/>
           </a:p>
@@ -2384,7 +3237,7 @@
           <a:p>
             <a:fld id="{DC56E06E-BEA2-4DD1-80C0-67F9D1558EE0}" type="datetimeFigureOut">
               <a:rPr lang="en-US" smtClean="0"/>
-              <a:t>5/4/2023</a:t>
+              <a:t>5/5/2023</a:t>
             </a:fld>
             <a:endParaRPr lang="en-US"/>
           </a:p>
@@ -2672,7 +3525,7 @@
           <a:p>
             <a:fld id="{DC56E06E-BEA2-4DD1-80C0-67F9D1558EE0}" type="datetimeFigureOut">
               <a:rPr lang="en-US" smtClean="0"/>
-              <a:t>5/4/2023</a:t>
+              <a:t>5/5/2023</a:t>
             </a:fld>
             <a:endParaRPr lang="en-US"/>
           </a:p>
@@ -2913,7 +3766,7 @@
           <a:p>
             <a:fld id="{DC56E06E-BEA2-4DD1-80C0-67F9D1558EE0}" type="datetimeFigureOut">
               <a:rPr lang="en-US" smtClean="0"/>
-              <a:t>5/4/2023</a:t>
+              <a:t>5/5/2023</a:t>
             </a:fld>
             <a:endParaRPr lang="en-US"/>
           </a:p>
@@ -3352,7 +4205,7 @@
           <a:lstStyle/>
           <a:p>
             <a:r>
-              <a:rPr lang="en-US" dirty="0"/>
+              <a:rPr lang="en-US" b="1" dirty="0"/>
               <a:t>IOT BRIDGE HEALTH MONITORING SYSTEM</a:t>
             </a:r>
           </a:p>
@@ -3431,7 +4284,6 @@
               <a:rPr lang="en-US" dirty="0"/>
               <a:t>MFUSE)</a:t>
             </a:r>
-            <a:endParaRPr lang="en-US" dirty="0"/>
           </a:p>
         </p:txBody>
       </p:sp>
@@ -3445,6 +4297,13 @@
   <p:clrMapOvr>
     <a:masterClrMapping/>
   </p:clrMapOvr>
+  <p:timing>
+    <p:tnLst>
+      <p:par>
+        <p:cTn id="1" dur="indefinite" restart="never" nodeType="tmRoot"/>
+      </p:par>
+    </p:tnLst>
+  </p:timing>
 </p:sld>
 </file>
 
@@ -3511,8 +4370,76 @@
         </p:nvSpPr>
         <p:spPr/>
         <p:txBody>
-          <a:bodyPr/>
-          <a:lstStyle/>
+          <a:bodyPr>
+            <a:normAutofit/>
+          </a:bodyPr>
+          <a:lstStyle/>
+          <a:p>
+            <a:r>
+              <a:rPr lang="en-US" dirty="0" smtClean="0"/>
+              <a:t>There have been cases in Malawi where bridges </a:t>
+            </a:r>
+            <a:r>
+              <a:rPr lang="en-US" dirty="0" smtClean="0"/>
+              <a:t>have collapsed unexpectedly</a:t>
+            </a:r>
+            <a:r>
+              <a:rPr lang="en-US" dirty="0" smtClean="0"/>
+              <a:t>, due to the fact that there is no system available to monitor the health status of the bridges. </a:t>
+            </a:r>
+          </a:p>
+          <a:p>
+            <a:r>
+              <a:rPr lang="en-IN" dirty="0" smtClean="0"/>
+              <a:t> Currently there </a:t>
+            </a:r>
+            <a:r>
+              <a:rPr lang="en-IN" dirty="0"/>
+              <a:t>is no adequate method for ensuring whether the bridge is safe for traveling or not, there are only assumptions that the bridges are safe for traveling. </a:t>
+            </a:r>
+            <a:endParaRPr lang="en-IN" dirty="0" smtClean="0"/>
+          </a:p>
+          <a:p>
+            <a:r>
+              <a:rPr lang="en-IN" dirty="0" smtClean="0"/>
+              <a:t>Due to </a:t>
+            </a:r>
+            <a:r>
+              <a:rPr lang="en-IN" dirty="0" smtClean="0"/>
+              <a:t>this, </a:t>
+            </a:r>
+            <a:r>
+              <a:rPr lang="en-IN" dirty="0" smtClean="0"/>
+              <a:t>all </a:t>
+            </a:r>
+            <a:r>
+              <a:rPr lang="en-IN" dirty="0"/>
+              <a:t>the hard work of various labours and the money invested for the construction of the bridge may go to </a:t>
+            </a:r>
+            <a:r>
+              <a:rPr lang="en-IN" dirty="0" smtClean="0"/>
+              <a:t>vain</a:t>
+            </a:r>
+          </a:p>
+          <a:p>
+            <a:r>
+              <a:rPr lang="en-IN" dirty="0"/>
+              <a:t>The </a:t>
+            </a:r>
+            <a:r>
+              <a:rPr lang="en-IN" dirty="0" smtClean="0"/>
+              <a:t>most </a:t>
+            </a:r>
+            <a:r>
+              <a:rPr lang="en-IN" dirty="0" smtClean="0"/>
+              <a:t> important thing  </a:t>
+            </a:r>
+            <a:r>
+              <a:rPr lang="en-IN" dirty="0"/>
+              <a:t>is to reduce the accidents which may occur on the bridge that may put people’s lives in jeopardy. </a:t>
+            </a:r>
+            <a:endParaRPr lang="en-US" dirty="0"/>
+          </a:p>
           <a:p>
             <a:endParaRPr lang="en-US" dirty="0"/>
           </a:p>
@@ -3528,6 +4455,13 @@
   <p:clrMapOvr>
     <a:masterClrMapping/>
   </p:clrMapOvr>
+  <p:timing>
+    <p:tnLst>
+      <p:par>
+        <p:cTn id="1" dur="indefinite" restart="never" nodeType="tmRoot"/>
+      </p:par>
+    </p:tnLst>
+  </p:timing>
 </p:sld>
 </file>
 
@@ -3590,6 +4524,46 @@
           <a:bodyPr/>
           <a:lstStyle/>
           <a:p>
+            <a:r>
+              <a:rPr lang="en-US" dirty="0" smtClean="0"/>
+              <a:t>The aim of this project is to design and develop an IOT based Bridge health monitoring System to </a:t>
+            </a:r>
+            <a:r>
+              <a:rPr lang="en-US" dirty="0" smtClean="0"/>
+              <a:t>ensure </a:t>
+            </a:r>
+            <a:r>
+              <a:rPr lang="en-US" dirty="0" smtClean="0"/>
+              <a:t>the structural integrity and safety of the bridges</a:t>
+            </a:r>
+          </a:p>
+          <a:p>
+            <a:r>
+              <a:rPr lang="en-US" dirty="0" smtClean="0"/>
+              <a:t>The system should be capable of monitoring various parameters such as vibrations, deformation and environmental factors such as rain.</a:t>
+            </a:r>
+          </a:p>
+          <a:p>
+            <a:r>
+              <a:rPr lang="en-US" dirty="0" smtClean="0"/>
+              <a:t>The system should provide real time data analysis and predictive </a:t>
+            </a:r>
+            <a:r>
+              <a:rPr lang="en-US" dirty="0" smtClean="0"/>
+              <a:t>maintenance </a:t>
+            </a:r>
+            <a:r>
+              <a:rPr lang="en-US" dirty="0" smtClean="0"/>
+              <a:t>to prevent accidents ,monitor fatigue and collision of materials </a:t>
+            </a:r>
+            <a:r>
+              <a:rPr lang="en-US" dirty="0" smtClean="0"/>
+              <a:t>,and </a:t>
+            </a:r>
+            <a:r>
+              <a:rPr lang="en-US" dirty="0" smtClean="0"/>
+              <a:t>alert relevant authorities or personnel in case of any safety hazards or abnormality.</a:t>
+            </a:r>
             <a:endParaRPr lang="en-US" dirty="0"/>
           </a:p>
         </p:txBody>
@@ -3604,6 +4578,13 @@
   <p:clrMapOvr>
     <a:masterClrMapping/>
   </p:clrMapOvr>
+  <p:timing>
+    <p:tnLst>
+      <p:par>
+        <p:cTn id="1" dur="indefinite" restart="never" nodeType="tmRoot"/>
+      </p:par>
+    </p:tnLst>
+  </p:timing>
 </p:sld>
 </file>
 
@@ -3641,7 +4622,7 @@
           <a:p>
             <a:r>
               <a:rPr lang="en-US" dirty="0" smtClean="0"/>
-              <a:t>Design</a:t>
+              <a:t>Comparison</a:t>
             </a:r>
             <a:endParaRPr lang="en-US" dirty="0"/>
           </a:p>
@@ -3649,27 +4630,209 @@
       </p:sp>
       <p:sp>
         <p:nvSpPr>
-          <p:cNvPr id="3" name="Content Placeholder 2"/>
-          <p:cNvSpPr>
-            <a:spLocks noGrp="1"/>
-          </p:cNvSpPr>
-          <p:nvPr>
-            <p:ph idx="1"/>
-          </p:nvPr>
-        </p:nvSpPr>
-        <p:spPr/>
-        <p:txBody>
-          <a:bodyPr/>
-          <a:lstStyle/>
-          <a:p>
-            <a:endParaRPr lang="en-US"/>
+          <p:cNvPr id="3" name="Text Placeholder 2"/>
+          <p:cNvSpPr>
+            <a:spLocks noGrp="1"/>
+          </p:cNvSpPr>
+          <p:nvPr>
+            <p:ph type="body" idx="1"/>
+          </p:nvPr>
+        </p:nvSpPr>
+        <p:spPr/>
+        <p:txBody>
+          <a:bodyPr/>
+          <a:lstStyle/>
+          <a:p>
+            <a:r>
+              <a:rPr lang="en-US" dirty="0" smtClean="0"/>
+              <a:t>Existing System</a:t>
+            </a:r>
+            <a:endParaRPr lang="en-US" dirty="0"/>
+          </a:p>
+        </p:txBody>
+      </p:sp>
+      <p:sp>
+        <p:nvSpPr>
+          <p:cNvPr id="4" name="Content Placeholder 3"/>
+          <p:cNvSpPr>
+            <a:spLocks noGrp="1"/>
+          </p:cNvSpPr>
+          <p:nvPr>
+            <p:ph sz="half" idx="2"/>
+          </p:nvPr>
+        </p:nvSpPr>
+        <p:spPr/>
+        <p:txBody>
+          <a:bodyPr>
+            <a:normAutofit fontScale="92500" lnSpcReduction="20000"/>
+          </a:bodyPr>
+          <a:lstStyle/>
+          <a:p>
+            <a:pPr lvl="0"/>
+            <a:r>
+              <a:rPr lang="en-IN" dirty="0"/>
+              <a:t>Not </a:t>
+            </a:r>
+            <a:r>
+              <a:rPr lang="en-IN" dirty="0" smtClean="0"/>
+              <a:t>aware </a:t>
+            </a:r>
+            <a:r>
+              <a:rPr lang="en-IN" dirty="0"/>
+              <a:t>of the safety of the structure.</a:t>
+            </a:r>
+            <a:endParaRPr lang="en-US" dirty="0"/>
+          </a:p>
+          <a:p>
+            <a:pPr lvl="0"/>
+            <a:r>
+              <a:rPr lang="en-IN" dirty="0"/>
+              <a:t>No monitoring system to ensure safety.</a:t>
+            </a:r>
+            <a:endParaRPr lang="en-US" dirty="0"/>
+          </a:p>
+          <a:p>
+            <a:pPr lvl="0"/>
+            <a:r>
+              <a:rPr lang="en-IN" dirty="0"/>
+              <a:t>Lack of sensor technology</a:t>
+            </a:r>
+            <a:endParaRPr lang="en-US" dirty="0"/>
+          </a:p>
+          <a:p>
+            <a:pPr lvl="0"/>
+            <a:r>
+              <a:rPr lang="en-IN" dirty="0"/>
+              <a:t>Lack of real time monitoring system.</a:t>
+            </a:r>
+            <a:endParaRPr lang="en-US" dirty="0"/>
+          </a:p>
+          <a:p>
+            <a:pPr lvl="0"/>
+            <a:r>
+              <a:rPr lang="en-IN" dirty="0"/>
+              <a:t>Unnecessary occurrences of </a:t>
+            </a:r>
+            <a:r>
+              <a:rPr lang="en-IN" dirty="0" smtClean="0"/>
+              <a:t>accidents.</a:t>
+            </a:r>
+            <a:endParaRPr lang="en-US" dirty="0"/>
+          </a:p>
+          <a:p>
+            <a:pPr lvl="0"/>
+            <a:r>
+              <a:rPr lang="en-IN" dirty="0"/>
+              <a:t>All labour works ending in </a:t>
+            </a:r>
+            <a:r>
+              <a:rPr lang="en-IN" dirty="0" smtClean="0"/>
+              <a:t>failure.</a:t>
+            </a:r>
+            <a:endParaRPr lang="en-US" dirty="0"/>
+          </a:p>
+          <a:p>
+            <a:endParaRPr lang="en-US" dirty="0"/>
+          </a:p>
+        </p:txBody>
+      </p:sp>
+      <p:sp>
+        <p:nvSpPr>
+          <p:cNvPr id="5" name="Text Placeholder 4"/>
+          <p:cNvSpPr>
+            <a:spLocks noGrp="1"/>
+          </p:cNvSpPr>
+          <p:nvPr>
+            <p:ph type="body" sz="quarter" idx="3"/>
+          </p:nvPr>
+        </p:nvSpPr>
+        <p:spPr/>
+        <p:txBody>
+          <a:bodyPr/>
+          <a:lstStyle/>
+          <a:p>
+            <a:r>
+              <a:rPr lang="en-US" dirty="0"/>
+              <a:t>P</a:t>
+            </a:r>
+            <a:r>
+              <a:rPr lang="en-US" dirty="0" smtClean="0"/>
+              <a:t>roposed System</a:t>
+            </a:r>
+            <a:endParaRPr lang="en-US" dirty="0"/>
+          </a:p>
+        </p:txBody>
+      </p:sp>
+      <p:sp>
+        <p:nvSpPr>
+          <p:cNvPr id="6" name="Content Placeholder 5"/>
+          <p:cNvSpPr>
+            <a:spLocks noGrp="1"/>
+          </p:cNvSpPr>
+          <p:nvPr>
+            <p:ph sz="quarter" idx="4"/>
+          </p:nvPr>
+        </p:nvSpPr>
+        <p:spPr/>
+        <p:txBody>
+          <a:bodyPr/>
+          <a:lstStyle/>
+          <a:p>
+            <a:pPr lvl="0"/>
+            <a:r>
+              <a:rPr lang="en-IN" dirty="0"/>
+              <a:t>Being aware of bridge conditions may lead to less accidents</a:t>
+            </a:r>
+            <a:endParaRPr lang="en-US" dirty="0"/>
+          </a:p>
+          <a:p>
+            <a:pPr lvl="0"/>
+            <a:r>
+              <a:rPr lang="en-IN" dirty="0"/>
+              <a:t>A real time monitoring system</a:t>
+            </a:r>
+            <a:endParaRPr lang="en-US" dirty="0"/>
+          </a:p>
+          <a:p>
+            <a:pPr lvl="0"/>
+            <a:r>
+              <a:rPr lang="en-IN" dirty="0"/>
+              <a:t>Uses different types of sensor technology</a:t>
+            </a:r>
+            <a:endParaRPr lang="en-US" dirty="0"/>
+          </a:p>
+          <a:p>
+            <a:pPr lvl="0"/>
+            <a:r>
+              <a:rPr lang="en-IN" dirty="0"/>
+              <a:t>Able to reduce accidents related to weather conditions</a:t>
+            </a:r>
+            <a:endParaRPr lang="en-US" dirty="0"/>
+          </a:p>
+          <a:p>
+            <a:pPr lvl="0"/>
+            <a:r>
+              <a:rPr lang="en-IN" dirty="0" err="1"/>
+              <a:t>IoT</a:t>
+            </a:r>
+            <a:r>
+              <a:rPr lang="en-IN" dirty="0"/>
+              <a:t> based monitoring system</a:t>
+            </a:r>
+            <a:endParaRPr lang="en-US" dirty="0"/>
+          </a:p>
+          <a:p>
+            <a:pPr marL="0" indent="0">
+              <a:buNone/>
+            </a:pPr>
+            <a:endParaRPr lang="en-US" dirty="0"/>
           </a:p>
         </p:txBody>
       </p:sp>
     </p:spTree>
     <p:extLst>
       <p:ext uri="{BB962C8B-B14F-4D97-AF65-F5344CB8AC3E}">
-        <p14:creationId xmlns:p14="http://schemas.microsoft.com/office/powerpoint/2010/main" val="3963942638"/>
+        <p14:creationId xmlns:p14="http://schemas.microsoft.com/office/powerpoint/2010/main" val="2631646068"/>
       </p:ext>
     </p:extLst>
   </p:cSld>
@@ -3713,12 +4876,94 @@
           <a:p>
             <a:r>
               <a:rPr lang="en-US" dirty="0" smtClean="0"/>
-              <a:t>Tools and techniques</a:t>
+              <a:t>Design(Block diagram)</a:t>
             </a:r>
             <a:endParaRPr lang="en-US" dirty="0"/>
           </a:p>
         </p:txBody>
       </p:sp>
+      <p:pic>
+        <p:nvPicPr>
+          <p:cNvPr id="4" name="Content Placeholder 3"/>
+          <p:cNvPicPr>
+            <a:picLocks noGrp="1" noChangeAspect="1"/>
+          </p:cNvPicPr>
+          <p:nvPr>
+            <p:ph idx="1"/>
+          </p:nvPr>
+        </p:nvPicPr>
+        <p:blipFill>
+          <a:blip r:embed="rId3">
+            <a:extLst>
+              <a:ext uri="{28A0092B-C50C-407E-A947-70E740481C1C}">
+                <a14:useLocalDpi xmlns:a14="http://schemas.microsoft.com/office/drawing/2010/main" val="0"/>
+              </a:ext>
+            </a:extLst>
+          </a:blip>
+          <a:stretch>
+            <a:fillRect/>
+          </a:stretch>
+        </p:blipFill>
+        <p:spPr>
+          <a:xfrm>
+            <a:off x="1535289" y="1456267"/>
+            <a:ext cx="8556978" cy="5305777"/>
+          </a:xfrm>
+        </p:spPr>
+      </p:pic>
+    </p:spTree>
+    <p:extLst>
+      <p:ext uri="{BB962C8B-B14F-4D97-AF65-F5344CB8AC3E}">
+        <p14:creationId xmlns:p14="http://schemas.microsoft.com/office/powerpoint/2010/main" val="3963942638"/>
+      </p:ext>
+    </p:extLst>
+  </p:cSld>
+  <p:clrMapOvr>
+    <a:masterClrMapping/>
+  </p:clrMapOvr>
+</p:sld>
+</file>
+
+<file path=ppt/slides/slide6.xml><?xml version="1.0" encoding="utf-8"?>
+<p:sld xmlns:a="http://schemas.openxmlformats.org/drawingml/2006/main" xmlns:r="http://schemas.openxmlformats.org/officeDocument/2006/relationships" xmlns:p="http://schemas.openxmlformats.org/presentationml/2006/main">
+  <p:cSld>
+    <p:spTree>
+      <p:nvGrpSpPr>
+        <p:cNvPr id="1" name=""/>
+        <p:cNvGrpSpPr/>
+        <p:nvPr/>
+      </p:nvGrpSpPr>
+      <p:grpSpPr>
+        <a:xfrm>
+          <a:off x="0" y="0"/>
+          <a:ext cx="0" cy="0"/>
+          <a:chOff x="0" y="0"/>
+          <a:chExt cx="0" cy="0"/>
+        </a:xfrm>
+      </p:grpSpPr>
+      <p:sp>
+        <p:nvSpPr>
+          <p:cNvPr id="2" name="Title 1"/>
+          <p:cNvSpPr>
+            <a:spLocks noGrp="1"/>
+          </p:cNvSpPr>
+          <p:nvPr>
+            <p:ph type="title"/>
+          </p:nvPr>
+        </p:nvSpPr>
+        <p:spPr/>
+        <p:txBody>
+          <a:bodyPr/>
+          <a:lstStyle/>
+          <a:p>
+            <a:r>
+              <a:rPr lang="en-US" dirty="0" smtClean="0"/>
+              <a:t>Tools</a:t>
+            </a:r>
+            <a:endParaRPr lang="en-US" dirty="0"/>
+          </a:p>
+        </p:txBody>
+      </p:sp>
       <p:sp>
         <p:nvSpPr>
           <p:cNvPr id="3" name="Content Placeholder 2"/>
@@ -3731,10 +4976,109 @@
         </p:nvSpPr>
         <p:spPr/>
         <p:txBody>
-          <a:bodyPr/>
-          <a:lstStyle/>
-          <a:p>
-            <a:endParaRPr lang="en-US"/>
+          <a:bodyPr>
+            <a:normAutofit/>
+          </a:bodyPr>
+          <a:lstStyle/>
+          <a:p>
+            <a:pPr marL="457200" lvl="1" indent="0">
+              <a:buNone/>
+            </a:pPr>
+            <a:r>
+              <a:rPr lang="en-IN" b="1" dirty="0"/>
+              <a:t> HARDWARE </a:t>
+            </a:r>
+            <a:r>
+              <a:rPr lang="en-IN" b="1" dirty="0" smtClean="0"/>
+              <a:t>REQUIREMENTS</a:t>
+            </a:r>
+            <a:endParaRPr lang="en-US" sz="2000" dirty="0"/>
+          </a:p>
+          <a:p>
+            <a:pPr lvl="1"/>
+            <a:r>
+              <a:rPr lang="en-IN" dirty="0" smtClean="0"/>
+              <a:t>Sensors       </a:t>
+            </a:r>
+            <a:r>
+              <a:rPr lang="en-IN" dirty="0"/>
+              <a:t>: Vibration, </a:t>
+            </a:r>
+            <a:r>
+              <a:rPr lang="en-IN" dirty="0" smtClean="0"/>
+              <a:t>Load cell, </a:t>
+            </a:r>
+            <a:r>
+              <a:rPr lang="en-IN" dirty="0" err="1" smtClean="0"/>
+              <a:t>songhe</a:t>
+            </a:r>
+            <a:r>
+              <a:rPr lang="en-IN" dirty="0" smtClean="0"/>
+              <a:t> Water level, </a:t>
+            </a:r>
+            <a:r>
+              <a:rPr lang="en-IN" dirty="0"/>
+              <a:t>ultrasonic </a:t>
+            </a:r>
+            <a:r>
+              <a:rPr lang="en-IN" dirty="0" smtClean="0"/>
+              <a:t>,				       accelerometer.</a:t>
+            </a:r>
+            <a:endParaRPr lang="en-US" dirty="0"/>
+          </a:p>
+          <a:p>
+            <a:pPr lvl="1"/>
+            <a:r>
+              <a:rPr lang="en-IN" dirty="0" smtClean="0"/>
+              <a:t>Display</a:t>
+            </a:r>
+            <a:r>
+              <a:rPr lang="en-IN" dirty="0"/>
+              <a:t>			:		</a:t>
+            </a:r>
+            <a:r>
+              <a:rPr lang="en-IN" dirty="0" smtClean="0"/>
+              <a:t>LCD.</a:t>
+            </a:r>
+            <a:endParaRPr lang="en-US" dirty="0"/>
+          </a:p>
+          <a:p>
+            <a:pPr lvl="1"/>
+            <a:r>
+              <a:rPr lang="en-IN" dirty="0" smtClean="0"/>
+              <a:t>Microcontroller </a:t>
+            </a:r>
+            <a:r>
+              <a:rPr lang="en-IN" dirty="0"/>
+              <a:t>		: 		</a:t>
+            </a:r>
+            <a:r>
+              <a:rPr lang="en-IN" dirty="0" smtClean="0"/>
+              <a:t>ESP8266</a:t>
+            </a:r>
+            <a:endParaRPr lang="en-US" dirty="0"/>
+          </a:p>
+          <a:p>
+            <a:pPr lvl="1"/>
+            <a:r>
+              <a:rPr lang="en-IN" dirty="0" smtClean="0"/>
+              <a:t>Others</a:t>
+            </a:r>
+            <a:r>
+              <a:rPr lang="en-IN" dirty="0"/>
+              <a:t>:                  Servo </a:t>
+            </a:r>
+            <a:r>
+              <a:rPr lang="en-IN" dirty="0" smtClean="0"/>
+              <a:t>motor</a:t>
+            </a:r>
+            <a:endParaRPr lang="en-US" dirty="0"/>
+          </a:p>
+          <a:p>
+            <a:pPr marL="0" indent="0">
+              <a:buNone/>
+            </a:pPr>
+            <a:endParaRPr lang="en-US" dirty="0"/>
           </a:p>
         </p:txBody>
       </p:sp>
@@ -4044,4 +5388,265 @@
     </a:ext>
   </a:extLst>
 </a:theme>
+</file>
+
+<file path=ppt/theme/theme2.xml><?xml version="1.0" encoding="utf-8"?>
+<a:theme xmlns:a="http://schemas.openxmlformats.org/drawingml/2006/main" name="Office Theme">
+  <a:themeElements>
+    <a:clrScheme name="Office">
+      <a:dk1>
+        <a:sysClr val="windowText" lastClr="000000"/>
+      </a:dk1>
+      <a:lt1>
+        <a:sysClr val="window" lastClr="FFFFFF"/>
+      </a:lt1>
+      <a:dk2>
+        <a:srgbClr val="44546A"/>
+      </a:dk2>
+      <a:lt2>
+        <a:srgbClr val="E7E6E6"/>
+      </a:lt2>
+      <a:accent1>
+        <a:srgbClr val="5B9BD5"/>
+      </a:accent1>
+      <a:accent2>
+        <a:srgbClr val="ED7D31"/>
+      </a:accent2>
+      <a:accent3>
+        <a:srgbClr val="A5A5A5"/>
+      </a:accent3>
+      <a:accent4>
+        <a:srgbClr val="FFC000"/>
+      </a:accent4>
+      <a:accent5>
+        <a:srgbClr val="4472C4"/>
+      </a:accent5>
+      <a:accent6>
+        <a:srgbClr val="70AD47"/>
+      </a:accent6>
+      <a:hlink>
+        <a:srgbClr val="0563C1"/>
+      </a:hlink>
+      <a:folHlink>
+        <a:srgbClr val="954F72"/>
+      </a:folHlink>
+    </a:clrScheme>
+    <a:fontScheme name="Office">
+      <a:majorFont>
+        <a:latin typeface="Calibri Light" panose="020F0302020204030204"/>
+        <a:ea typeface=""/>
+        <a:cs typeface=""/>
+        <a:font script="Jpan" typeface="ＭＳ Ｐゴシック"/>
+        <a:font script="Hang" typeface="맑은 고딕"/>
+        <a:font script="Hans" typeface="宋体"/>
+        <a:font script="Hant" typeface="新細明體"/>
+        <a:font script="Arab" typeface="Times New Roman"/>
+        <a:font script="Hebr" typeface="Times New Roman"/>
+        <a:font script="Thai" typeface="Angsana New"/>
+        <a:font script="Ethi" typeface="Nyala"/>
+        <a:font script="Beng" typeface="Vrinda"/>
+        <a:font script="Gujr" typeface="Shruti"/>
+        <a:font script="Khmr" typeface="MoolBoran"/>
+        <a:font script="Knda" typeface="Tunga"/>
+        <a:font script="Guru" typeface="Raavi"/>
+        <a:font script="Cans" typeface="Euphemia"/>
+        <a:font script="Cher" typeface="Plantagenet Cherokee"/>
+        <a:font script="Yiii" typeface="Microsoft Yi Baiti"/>
+        <a:font script="Tibt" typeface="Microsoft Himalaya"/>
+        <a:font script="Thaa" typeface="MV Boli"/>
+        <a:font script="Deva" typeface="Mangal"/>
+        <a:font script="Telu" typeface="Gautami"/>
+        <a:font script="Taml" typeface="Latha"/>
+        <a:font script="Syrc" typeface="Estrangelo Edessa"/>
+        <a:font script="Orya" typeface="Kalinga"/>
+        <a:font script="Mlym" typeface="Kartika"/>
+        <a:font script="Laoo" typeface="DokChampa"/>
+        <a:font script="Sinh" typeface="Iskoola Pota"/>
+        <a:font script="Mong" typeface="Mongolian Baiti"/>
+        <a:font script="Viet" typeface="Times New Roman"/>
+        <a:font script="Uigh" typeface="Microsoft Uighur"/>
+        <a:font script="Geor" typeface="Sylfaen"/>
+      </a:majorFont>
+      <a:minorFont>
+        <a:latin typeface="Calibri" panose="020F0502020204030204"/>
+        <a:ea typeface=""/>
+        <a:cs typeface=""/>
+        <a:font script="Jpan" typeface="ＭＳ Ｐゴシック"/>
+        <a:font script="Hang" typeface="맑은 고딕"/>
+        <a:font script="Hans" typeface="宋体"/>
+        <a:font script="Hant" typeface="新細明體"/>
+        <a:font script="Arab" typeface="Arial"/>
+        <a:font script="Hebr" typeface="Arial"/>
+        <a:font script="Thai" typeface="Cordia New"/>
+        <a:font script="Ethi" typeface="Nyala"/>
+        <a:font script="Beng" typeface="Vrinda"/>
+        <a:font script="Gujr" typeface="Shruti"/>
+        <a:font script="Khmr" typeface="DaunPenh"/>
+        <a:font script="Knda" typeface="Tunga"/>
+        <a:font script="Guru" typeface="Raavi"/>
+        <a:font script="Cans" typeface="Euphemia"/>
+        <a:font script="Cher" typeface="Plantagenet Cherokee"/>
+        <a:font script="Yiii" typeface="Microsoft Yi Baiti"/>
+        <a:font script="Tibt" typeface="Microsoft Himalaya"/>
+        <a:font script="Thaa" typeface="MV Boli"/>
+        <a:font script="Deva" typeface="Mangal"/>
+        <a:font script="Telu" typeface="Gautami"/>
+        <a:font script="Taml" typeface="Latha"/>
+        <a:font script="Syrc" typeface="Estrangelo Edessa"/>
+        <a:font script="Orya" typeface="Kalinga"/>
+        <a:font script="Mlym" typeface="Kartika"/>
+        <a:font script="Laoo" typeface="DokChampa"/>
+        <a:font script="Sinh" typeface="Iskoola Pota"/>
+        <a:font script="Mong" typeface="Mongolian Baiti"/>
+        <a:font script="Viet" typeface="Arial"/>
+        <a:font script="Uigh" typeface="Microsoft Uighur"/>
+        <a:font script="Geor" typeface="Sylfaen"/>
+      </a:minorFont>
+    </a:fontScheme>
+    <a:fmtScheme name="Office">
+      <a:fillStyleLst>
+        <a:solidFill>
+          <a:schemeClr val="phClr"/>
+        </a:solidFill>
+        <a:gradFill rotWithShape="1">
+          <a:gsLst>
+            <a:gs pos="0">
+              <a:schemeClr val="phClr">
+                <a:lumMod val="110000"/>
+                <a:satMod val="105000"/>
+                <a:tint val="67000"/>
+              </a:schemeClr>
+            </a:gs>
+            <a:gs pos="50000">
+              <a:schemeClr val="phClr">
+                <a:lumMod val="105000"/>
+                <a:satMod val="103000"/>
+                <a:tint val="73000"/>
+              </a:schemeClr>
+            </a:gs>
+            <a:gs pos="100000">
+              <a:schemeClr val="phClr">
+                <a:lumMod val="105000"/>
+                <a:satMod val="109000"/>
+                <a:tint val="81000"/>
+              </a:schemeClr>
+            </a:gs>
+          </a:gsLst>
+          <a:lin ang="5400000" scaled="0"/>
+        </a:gradFill>
+        <a:gradFill rotWithShape="1">
+          <a:gsLst>
+            <a:gs pos="0">
+              <a:schemeClr val="phClr">
+                <a:satMod val="103000"/>
+                <a:lumMod val="102000"/>
+                <a:tint val="94000"/>
+              </a:schemeClr>
+            </a:gs>
+            <a:gs pos="50000">
+              <a:schemeClr val="phClr">
+                <a:satMod val="110000"/>
+                <a:lumMod val="100000"/>
+                <a:shade val="100000"/>
+              </a:schemeClr>
+            </a:gs>
+            <a:gs pos="100000">
+              <a:schemeClr val="phClr">
+                <a:lumMod val="99000"/>
+                <a:satMod val="120000"/>
+                <a:shade val="78000"/>
+              </a:schemeClr>
+            </a:gs>
+          </a:gsLst>
+          <a:lin ang="5400000" scaled="0"/>
+        </a:gradFill>
+      </a:fillStyleLst>
+      <a:lnStyleLst>
+        <a:ln w="6350" cap="flat" cmpd="sng" algn="ctr">
+          <a:solidFill>
+            <a:schemeClr val="phClr"/>
+          </a:solidFill>
+          <a:prstDash val="solid"/>
+          <a:miter lim="800000"/>
+        </a:ln>
+        <a:ln w="12700" cap="flat" cmpd="sng" algn="ctr">
+          <a:solidFill>
+            <a:schemeClr val="phClr"/>
+          </a:solidFill>
+          <a:prstDash val="solid"/>
+          <a:miter lim="800000"/>
+        </a:ln>
+        <a:ln w="19050" cap="flat" cmpd="sng" algn="ctr">
+          <a:solidFill>
+            <a:schemeClr val="phClr"/>
+          </a:solidFill>
+          <a:prstDash val="solid"/>
+          <a:miter lim="800000"/>
+        </a:ln>
+      </a:lnStyleLst>
+      <a:effectStyleLst>
+        <a:effectStyle>
+          <a:effectLst/>
+        </a:effectStyle>
+        <a:effectStyle>
+          <a:effectLst/>
+        </a:effectStyle>
+        <a:effectStyle>
+          <a:effectLst>
+            <a:outerShdw blurRad="57150" dist="19050" dir="5400000" algn="ctr" rotWithShape="0">
+              <a:srgbClr val="000000">
+                <a:alpha val="63000"/>
+              </a:srgbClr>
+            </a:outerShdw>
+          </a:effectLst>
+        </a:effectStyle>
+      </a:effectStyleLst>
+      <a:bgFillStyleLst>
+        <a:solidFill>
+          <a:schemeClr val="phClr"/>
+        </a:solidFill>
+        <a:solidFill>
+          <a:schemeClr val="phClr">
+            <a:tint val="95000"/>
+            <a:satMod val="170000"/>
+          </a:schemeClr>
+        </a:solidFill>
+        <a:gradFill rotWithShape="1">
+          <a:gsLst>
+            <a:gs pos="0">
+              <a:schemeClr val="phClr">
+                <a:tint val="93000"/>
+                <a:satMod val="150000"/>
+                <a:shade val="98000"/>
+                <a:lumMod val="102000"/>
+              </a:schemeClr>
+            </a:gs>
+            <a:gs pos="50000">
+              <a:schemeClr val="phClr">
+                <a:tint val="98000"/>
+                <a:satMod val="130000"/>
+                <a:shade val="90000"/>
+                <a:lumMod val="103000"/>
+              </a:schemeClr>
+            </a:gs>
+            <a:gs pos="100000">
+              <a:schemeClr val="phClr">
+                <a:shade val="63000"/>
+                <a:satMod val="120000"/>
+              </a:schemeClr>
+            </a:gs>
+          </a:gsLst>
+          <a:lin ang="5400000" scaled="0"/>
+        </a:gradFill>
+      </a:bgFillStyleLst>
+    </a:fmtScheme>
+  </a:themeElements>
+  <a:objectDefaults/>
+  <a:extraClrSchemeLst/>
+  <a:extLst>
+    <a:ext uri="{05A4C25C-085E-4340-85A3-A5531E510DB2}">
+      <thm15:themeFamily xmlns:thm15="http://schemas.microsoft.com/office/thememl/2012/main" name="Office Theme" id="{62F939B6-93AF-4DB8-9C6B-D6C7DFDC589F}" vid="{4A3C46E8-61CC-4603-A589-7422A47A8E4A}"/>
+    </a:ext>
+  </a:extLst>
+</a:theme>
 </file>
</xml_diff>

<commit_message>
Added code for esp8266 final
</commit_message>
<xml_diff>
--- a/Project Documents/IOT BRIDGE HEALTH MONITORING SYSTEM.pptx
+++ b/Project Documents/IOT BRIDGE HEALTH MONITORING SYSTEM.pptx
@@ -5,15 +5,17 @@
     <p:sldMasterId id="2147483648" r:id="rId1"/>
   </p:sldMasterIdLst>
   <p:notesMasterIdLst>
-    <p:notesMasterId r:id="rId8"/>
+    <p:notesMasterId r:id="rId10"/>
   </p:notesMasterIdLst>
   <p:sldIdLst>
     <p:sldId id="256" r:id="rId2"/>
     <p:sldId id="257" r:id="rId3"/>
     <p:sldId id="258" r:id="rId4"/>
-    <p:sldId id="261" r:id="rId5"/>
-    <p:sldId id="259" r:id="rId6"/>
-    <p:sldId id="260" r:id="rId7"/>
+    <p:sldId id="262" r:id="rId5"/>
+    <p:sldId id="261" r:id="rId6"/>
+    <p:sldId id="259" r:id="rId7"/>
+    <p:sldId id="263" r:id="rId8"/>
+    <p:sldId id="260" r:id="rId9"/>
   </p:sldIdLst>
   <p:sldSz cx="12192000" cy="6858000"/>
   <p:notesSz cx="6858000" cy="9144000"/>
@@ -513,58 +515,7 @@
           <a:bodyPr/>
           <a:lstStyle/>
           <a:p>
-            <a:r>
-              <a:rPr lang="en-US" dirty="0"/>
-              <a:t>Function and non functional requirements</a:t>
-            </a:r>
-          </a:p>
-          <a:p>
-            <a:r>
-              <a:rPr lang="en-US" dirty="0"/>
-              <a:t>Tools</a:t>
-            </a:r>
-          </a:p>
-          <a:p>
-            <a:r>
-              <a:rPr lang="en-US" dirty="0"/>
-              <a:t>Introduction</a:t>
-            </a:r>
-          </a:p>
-          <a:p>
-            <a:r>
-              <a:rPr lang="en-US" dirty="0"/>
-              <a:t>Functionality</a:t>
-            </a:r>
-          </a:p>
-          <a:p>
-            <a:r>
-              <a:rPr lang="en-US" dirty="0"/>
-              <a:t>Target users</a:t>
-            </a:r>
-          </a:p>
-          <a:p>
-            <a:r>
-              <a:rPr lang="en-US" dirty="0"/>
-              <a:t>Problem statement</a:t>
-            </a:r>
-          </a:p>
-          <a:p>
-            <a:r>
-              <a:rPr lang="en-US" dirty="0"/>
-              <a:t>Solution</a:t>
-            </a:r>
-          </a:p>
-          <a:p>
-            <a:r>
-              <a:rPr lang="en-US" dirty="0"/>
-              <a:t>Services</a:t>
-            </a:r>
-          </a:p>
-          <a:p>
-            <a:r>
-              <a:rPr lang="en-US"/>
-              <a:t>About project</a:t>
-            </a:r>
+            <a:endParaRPr lang="en-US" dirty="0"/>
           </a:p>
         </p:txBody>
       </p:sp>
@@ -903,7 +854,7 @@
           <a:p>
             <a:fld id="{A45837CD-F375-46AB-AB47-CE56D837565E}" type="slidenum">
               <a:rPr lang="en-US" smtClean="0"/>
-              <a:t>4</a:t>
+              <a:t>5</a:t>
             </a:fld>
             <a:endParaRPr lang="en-US"/>
           </a:p>
@@ -987,7 +938,7 @@
           <a:p>
             <a:fld id="{A45837CD-F375-46AB-AB47-CE56D837565E}" type="slidenum">
               <a:rPr lang="en-US" smtClean="0"/>
-              <a:t>5</a:t>
+              <a:t>6</a:t>
             </a:fld>
             <a:endParaRPr lang="en-US"/>
           </a:p>
@@ -1071,7 +1022,7 @@
           <a:p>
             <a:fld id="{A45837CD-F375-46AB-AB47-CE56D837565E}" type="slidenum">
               <a:rPr lang="en-US" smtClean="0"/>
-              <a:t>6</a:t>
+              <a:t>8</a:t>
             </a:fld>
             <a:endParaRPr lang="en-US"/>
           </a:p>
@@ -4608,7 +4559,13 @@
       </p:grpSpPr>
       <p:sp>
         <p:nvSpPr>
-          <p:cNvPr id="2" name="Title 1"/>
+          <p:cNvPr id="2" name="Title 1">
+            <a:extLst>
+              <a:ext uri="{FF2B5EF4-FFF2-40B4-BE49-F238E27FC236}">
+                <a16:creationId xmlns:a16="http://schemas.microsoft.com/office/drawing/2014/main" id="{772E15D2-E19B-8AF4-0693-A9A3D6CFC7AC}"/>
+              </a:ext>
+            </a:extLst>
+          </p:cNvPr>
           <p:cNvSpPr>
             <a:spLocks noGrp="1"/>
           </p:cNvSpPr>
@@ -4623,19 +4580,25 @@
           <a:p>
             <a:r>
               <a:rPr lang="en-US" dirty="0"/>
-              <a:t>Comparison</a:t>
-            </a:r>
-          </a:p>
-        </p:txBody>
-      </p:sp>
-      <p:sp>
-        <p:nvSpPr>
-          <p:cNvPr id="3" name="Text Placeholder 2"/>
-          <p:cNvSpPr>
-            <a:spLocks noGrp="1"/>
-          </p:cNvSpPr>
-          <p:nvPr>
-            <p:ph type="body" idx="1"/>
+              <a:t>Target users</a:t>
+            </a:r>
+          </a:p>
+        </p:txBody>
+      </p:sp>
+      <p:sp>
+        <p:nvSpPr>
+          <p:cNvPr id="3" name="Content Placeholder 2">
+            <a:extLst>
+              <a:ext uri="{FF2B5EF4-FFF2-40B4-BE49-F238E27FC236}">
+                <a16:creationId xmlns:a16="http://schemas.microsoft.com/office/drawing/2014/main" id="{8F094154-1EA2-1A93-1CEE-D8BE585004A5}"/>
+              </a:ext>
+            </a:extLst>
+          </p:cNvPr>
+          <p:cNvSpPr>
+            <a:spLocks noGrp="1"/>
+          </p:cNvSpPr>
+          <p:nvPr>
+            <p:ph idx="1"/>
           </p:nvPr>
         </p:nvSpPr>
         <p:spPr/>
@@ -4645,172 +4608,21 @@
           <a:p>
             <a:r>
               <a:rPr lang="en-US" dirty="0"/>
-              <a:t>Existing System</a:t>
-            </a:r>
-          </a:p>
-        </p:txBody>
-      </p:sp>
-      <p:sp>
-        <p:nvSpPr>
-          <p:cNvPr id="4" name="Content Placeholder 3"/>
-          <p:cNvSpPr>
-            <a:spLocks noGrp="1"/>
-          </p:cNvSpPr>
-          <p:nvPr>
-            <p:ph sz="half" idx="2"/>
-          </p:nvPr>
-        </p:nvSpPr>
-        <p:spPr/>
-        <p:txBody>
-          <a:bodyPr>
-            <a:normAutofit fontScale="92500" lnSpcReduction="20000"/>
-          </a:bodyPr>
-          <a:lstStyle/>
-          <a:p>
-            <a:pPr lvl="0"/>
-            <a:r>
-              <a:rPr lang="en-IN" dirty="0"/>
-              <a:t>Not aware of the safety of the structure.</a:t>
-            </a:r>
-            <a:endParaRPr lang="en-US" dirty="0"/>
-          </a:p>
-          <a:p>
-            <a:pPr lvl="0"/>
-            <a:r>
-              <a:rPr lang="en-IN" dirty="0"/>
-              <a:t>No monitoring system to ensure safety.</a:t>
-            </a:r>
-            <a:endParaRPr lang="en-US" dirty="0"/>
-          </a:p>
-          <a:p>
-            <a:pPr lvl="0"/>
-            <a:r>
-              <a:rPr lang="en-IN" dirty="0"/>
-              <a:t>Lack of sensor technology</a:t>
-            </a:r>
-            <a:endParaRPr lang="en-US" dirty="0"/>
-          </a:p>
-          <a:p>
-            <a:pPr lvl="0"/>
-            <a:r>
-              <a:rPr lang="en-IN" dirty="0"/>
-              <a:t>Lack of real time monitoring system.</a:t>
-            </a:r>
-            <a:endParaRPr lang="en-US" dirty="0"/>
-          </a:p>
-          <a:p>
-            <a:pPr lvl="0"/>
-            <a:r>
-              <a:rPr lang="en-IN" dirty="0"/>
-              <a:t>Unnecessary occurrences of accidents.</a:t>
-            </a:r>
-            <a:endParaRPr lang="en-US" dirty="0"/>
-          </a:p>
-          <a:p>
-            <a:pPr lvl="0"/>
-            <a:r>
-              <a:rPr lang="en-IN" dirty="0"/>
-              <a:t>All labour works ending in failure.</a:t>
-            </a:r>
-            <a:endParaRPr lang="en-US" dirty="0"/>
-          </a:p>
-          <a:p>
-            <a:endParaRPr lang="en-US" dirty="0"/>
-          </a:p>
-        </p:txBody>
-      </p:sp>
-      <p:sp>
-        <p:nvSpPr>
-          <p:cNvPr id="5" name="Text Placeholder 4"/>
-          <p:cNvSpPr>
-            <a:spLocks noGrp="1"/>
-          </p:cNvSpPr>
-          <p:nvPr>
-            <p:ph type="body" sz="quarter" idx="3"/>
-          </p:nvPr>
-        </p:nvSpPr>
-        <p:spPr/>
-        <p:txBody>
-          <a:bodyPr/>
-          <a:lstStyle/>
+              <a:t>Malawi Roads Authority</a:t>
+            </a:r>
+          </a:p>
           <a:p>
             <a:r>
               <a:rPr lang="en-US" dirty="0"/>
-              <a:t>Proposed System</a:t>
-            </a:r>
-          </a:p>
-        </p:txBody>
-      </p:sp>
-      <p:sp>
-        <p:nvSpPr>
-          <p:cNvPr id="6" name="Content Placeholder 5"/>
-          <p:cNvSpPr>
-            <a:spLocks noGrp="1"/>
-          </p:cNvSpPr>
-          <p:nvPr>
-            <p:ph sz="quarter" idx="4"/>
-          </p:nvPr>
-        </p:nvSpPr>
-        <p:spPr/>
-        <p:txBody>
-          <a:bodyPr/>
-          <a:lstStyle/>
-          <a:p>
-            <a:pPr lvl="0"/>
-            <a:r>
-              <a:rPr lang="en-IN" dirty="0"/>
-              <a:t>Being aware of bridge conditions may lead to less accidents</a:t>
-            </a:r>
-            <a:endParaRPr lang="en-US" dirty="0"/>
-          </a:p>
-          <a:p>
-            <a:pPr lvl="0"/>
-            <a:r>
-              <a:rPr lang="en-IN" dirty="0"/>
-              <a:t>A real time monitoring system</a:t>
-            </a:r>
-            <a:endParaRPr lang="en-US" dirty="0"/>
-          </a:p>
-          <a:p>
-            <a:pPr lvl="0"/>
-            <a:r>
-              <a:rPr lang="en-IN" dirty="0"/>
-              <a:t>Uses different types of sensor technology</a:t>
-            </a:r>
-            <a:endParaRPr lang="en-US" dirty="0"/>
-          </a:p>
-          <a:p>
-            <a:pPr lvl="0"/>
-            <a:r>
-              <a:rPr lang="en-IN" dirty="0"/>
-              <a:t>Able to reduce accidents related to weather conditions</a:t>
-            </a:r>
-            <a:endParaRPr lang="en-US" dirty="0"/>
-          </a:p>
-          <a:p>
-            <a:pPr lvl="0"/>
-            <a:r>
-              <a:rPr lang="en-IN" dirty="0" err="1"/>
-              <a:t>IoT</a:t>
-            </a:r>
-            <a:r>
-              <a:rPr lang="en-IN" dirty="0"/>
-              <a:t> based monitoring system</a:t>
-            </a:r>
-            <a:endParaRPr lang="en-US" dirty="0"/>
-          </a:p>
-          <a:p>
-            <a:pPr marL="0" indent="0">
-              <a:buNone/>
-            </a:pPr>
-            <a:endParaRPr lang="en-US" dirty="0"/>
+              <a:t>All road users.</a:t>
+            </a:r>
           </a:p>
         </p:txBody>
       </p:sp>
     </p:spTree>
     <p:extLst>
       <p:ext uri="{BB962C8B-B14F-4D97-AF65-F5344CB8AC3E}">
-        <p14:creationId xmlns:p14="http://schemas.microsoft.com/office/powerpoint/2010/main" val="2631646068"/>
+        <p14:creationId xmlns:p14="http://schemas.microsoft.com/office/powerpoint/2010/main" val="3863311681"/>
       </p:ext>
     </p:extLst>
   </p:cSld>
@@ -4854,6 +4666,237 @@
           <a:p>
             <a:r>
               <a:rPr lang="en-US" dirty="0"/>
+              <a:t>Comparison</a:t>
+            </a:r>
+          </a:p>
+        </p:txBody>
+      </p:sp>
+      <p:sp>
+        <p:nvSpPr>
+          <p:cNvPr id="3" name="Text Placeholder 2"/>
+          <p:cNvSpPr>
+            <a:spLocks noGrp="1"/>
+          </p:cNvSpPr>
+          <p:nvPr>
+            <p:ph type="body" idx="1"/>
+          </p:nvPr>
+        </p:nvSpPr>
+        <p:spPr/>
+        <p:txBody>
+          <a:bodyPr/>
+          <a:lstStyle/>
+          <a:p>
+            <a:r>
+              <a:rPr lang="en-US" dirty="0"/>
+              <a:t>Existing System</a:t>
+            </a:r>
+          </a:p>
+        </p:txBody>
+      </p:sp>
+      <p:sp>
+        <p:nvSpPr>
+          <p:cNvPr id="4" name="Content Placeholder 3"/>
+          <p:cNvSpPr>
+            <a:spLocks noGrp="1"/>
+          </p:cNvSpPr>
+          <p:nvPr>
+            <p:ph sz="half" idx="2"/>
+          </p:nvPr>
+        </p:nvSpPr>
+        <p:spPr/>
+        <p:txBody>
+          <a:bodyPr>
+            <a:normAutofit fontScale="92500" lnSpcReduction="20000"/>
+          </a:bodyPr>
+          <a:lstStyle/>
+          <a:p>
+            <a:pPr lvl="0"/>
+            <a:r>
+              <a:rPr lang="en-IN" dirty="0"/>
+              <a:t>Not aware of the safety of the structure.</a:t>
+            </a:r>
+            <a:endParaRPr lang="en-US" dirty="0"/>
+          </a:p>
+          <a:p>
+            <a:pPr lvl="0"/>
+            <a:r>
+              <a:rPr lang="en-IN" dirty="0"/>
+              <a:t>No monitoring system to ensure safety.</a:t>
+            </a:r>
+            <a:endParaRPr lang="en-US" dirty="0"/>
+          </a:p>
+          <a:p>
+            <a:pPr lvl="0"/>
+            <a:r>
+              <a:rPr lang="en-IN" dirty="0"/>
+              <a:t>Lack of sensor technology</a:t>
+            </a:r>
+            <a:endParaRPr lang="en-US" dirty="0"/>
+          </a:p>
+          <a:p>
+            <a:pPr lvl="0"/>
+            <a:r>
+              <a:rPr lang="en-IN" dirty="0"/>
+              <a:t>Lack of real time monitoring system.</a:t>
+            </a:r>
+            <a:endParaRPr lang="en-US" dirty="0"/>
+          </a:p>
+          <a:p>
+            <a:pPr lvl="0"/>
+            <a:r>
+              <a:rPr lang="en-IN" dirty="0"/>
+              <a:t>Unnecessary occurrences of accidents.</a:t>
+            </a:r>
+            <a:endParaRPr lang="en-US" dirty="0"/>
+          </a:p>
+          <a:p>
+            <a:pPr lvl="0"/>
+            <a:r>
+              <a:rPr lang="en-IN" dirty="0"/>
+              <a:t>All labour works ending in failure.</a:t>
+            </a:r>
+            <a:endParaRPr lang="en-US" dirty="0"/>
+          </a:p>
+          <a:p>
+            <a:endParaRPr lang="en-US" dirty="0"/>
+          </a:p>
+        </p:txBody>
+      </p:sp>
+      <p:sp>
+        <p:nvSpPr>
+          <p:cNvPr id="5" name="Text Placeholder 4"/>
+          <p:cNvSpPr>
+            <a:spLocks noGrp="1"/>
+          </p:cNvSpPr>
+          <p:nvPr>
+            <p:ph type="body" sz="quarter" idx="3"/>
+          </p:nvPr>
+        </p:nvSpPr>
+        <p:spPr/>
+        <p:txBody>
+          <a:bodyPr/>
+          <a:lstStyle/>
+          <a:p>
+            <a:r>
+              <a:rPr lang="en-US" dirty="0"/>
+              <a:t>Proposed System</a:t>
+            </a:r>
+          </a:p>
+        </p:txBody>
+      </p:sp>
+      <p:sp>
+        <p:nvSpPr>
+          <p:cNvPr id="6" name="Content Placeholder 5"/>
+          <p:cNvSpPr>
+            <a:spLocks noGrp="1"/>
+          </p:cNvSpPr>
+          <p:nvPr>
+            <p:ph sz="quarter" idx="4"/>
+          </p:nvPr>
+        </p:nvSpPr>
+        <p:spPr/>
+        <p:txBody>
+          <a:bodyPr/>
+          <a:lstStyle/>
+          <a:p>
+            <a:pPr lvl="0"/>
+            <a:r>
+              <a:rPr lang="en-IN" dirty="0"/>
+              <a:t>Being aware of bridge conditions may lead to less accidents</a:t>
+            </a:r>
+            <a:endParaRPr lang="en-US" dirty="0"/>
+          </a:p>
+          <a:p>
+            <a:pPr lvl="0"/>
+            <a:r>
+              <a:rPr lang="en-IN" dirty="0"/>
+              <a:t>A real time monitoring system</a:t>
+            </a:r>
+            <a:endParaRPr lang="en-US" dirty="0"/>
+          </a:p>
+          <a:p>
+            <a:pPr lvl="0"/>
+            <a:r>
+              <a:rPr lang="en-IN" dirty="0"/>
+              <a:t>Uses different types of sensor technology</a:t>
+            </a:r>
+            <a:endParaRPr lang="en-US" dirty="0"/>
+          </a:p>
+          <a:p>
+            <a:pPr lvl="0"/>
+            <a:r>
+              <a:rPr lang="en-IN" dirty="0"/>
+              <a:t>Able to reduce accidents related to weather conditions</a:t>
+            </a:r>
+            <a:endParaRPr lang="en-US" dirty="0"/>
+          </a:p>
+          <a:p>
+            <a:pPr lvl="0"/>
+            <a:r>
+              <a:rPr lang="en-IN" dirty="0" err="1"/>
+              <a:t>IoT</a:t>
+            </a:r>
+            <a:r>
+              <a:rPr lang="en-IN" dirty="0"/>
+              <a:t> based monitoring system</a:t>
+            </a:r>
+            <a:endParaRPr lang="en-US" dirty="0"/>
+          </a:p>
+          <a:p>
+            <a:pPr marL="0" indent="0">
+              <a:buNone/>
+            </a:pPr>
+            <a:endParaRPr lang="en-US" dirty="0"/>
+          </a:p>
+        </p:txBody>
+      </p:sp>
+    </p:spTree>
+    <p:extLst>
+      <p:ext uri="{BB962C8B-B14F-4D97-AF65-F5344CB8AC3E}">
+        <p14:creationId xmlns:p14="http://schemas.microsoft.com/office/powerpoint/2010/main" val="2631646068"/>
+      </p:ext>
+    </p:extLst>
+  </p:cSld>
+  <p:clrMapOvr>
+    <a:masterClrMapping/>
+  </p:clrMapOvr>
+</p:sld>
+</file>
+
+<file path=ppt/slides/slide6.xml><?xml version="1.0" encoding="utf-8"?>
+<p:sld xmlns:a="http://schemas.openxmlformats.org/drawingml/2006/main" xmlns:r="http://schemas.openxmlformats.org/officeDocument/2006/relationships" xmlns:p="http://schemas.openxmlformats.org/presentationml/2006/main">
+  <p:cSld>
+    <p:spTree>
+      <p:nvGrpSpPr>
+        <p:cNvPr id="1" name=""/>
+        <p:cNvGrpSpPr/>
+        <p:nvPr/>
+      </p:nvGrpSpPr>
+      <p:grpSpPr>
+        <a:xfrm>
+          <a:off x="0" y="0"/>
+          <a:ext cx="0" cy="0"/>
+          <a:chOff x="0" y="0"/>
+          <a:chExt cx="0" cy="0"/>
+        </a:xfrm>
+      </p:grpSpPr>
+      <p:sp>
+        <p:nvSpPr>
+          <p:cNvPr id="2" name="Title 1"/>
+          <p:cNvSpPr>
+            <a:spLocks noGrp="1"/>
+          </p:cNvSpPr>
+          <p:nvPr>
+            <p:ph type="title"/>
+          </p:nvPr>
+        </p:nvSpPr>
+        <p:spPr/>
+        <p:txBody>
+          <a:bodyPr/>
+          <a:lstStyle/>
+          <a:p>
+            <a:r>
+              <a:rPr lang="en-US" dirty="0"/>
               <a:t>Design(Block diagram)</a:t>
             </a:r>
           </a:p>
@@ -4901,7 +4944,105 @@
 </p:sld>
 </file>
 
-<file path=ppt/slides/slide6.xml><?xml version="1.0" encoding="utf-8"?>
+<file path=ppt/slides/slide7.xml><?xml version="1.0" encoding="utf-8"?>
+<p:sld xmlns:a="http://schemas.openxmlformats.org/drawingml/2006/main" xmlns:r="http://schemas.openxmlformats.org/officeDocument/2006/relationships" xmlns:p="http://schemas.openxmlformats.org/presentationml/2006/main">
+  <p:cSld>
+    <p:spTree>
+      <p:nvGrpSpPr>
+        <p:cNvPr id="1" name=""/>
+        <p:cNvGrpSpPr/>
+        <p:nvPr/>
+      </p:nvGrpSpPr>
+      <p:grpSpPr>
+        <a:xfrm>
+          <a:off x="0" y="0"/>
+          <a:ext cx="0" cy="0"/>
+          <a:chOff x="0" y="0"/>
+          <a:chExt cx="0" cy="0"/>
+        </a:xfrm>
+      </p:grpSpPr>
+      <p:sp>
+        <p:nvSpPr>
+          <p:cNvPr id="2" name="Title 1">
+            <a:extLst>
+              <a:ext uri="{FF2B5EF4-FFF2-40B4-BE49-F238E27FC236}">
+                <a16:creationId xmlns:a16="http://schemas.microsoft.com/office/drawing/2014/main" id="{82B217AB-CEB4-7AE9-5DF6-569E51D95CA9}"/>
+              </a:ext>
+            </a:extLst>
+          </p:cNvPr>
+          <p:cNvSpPr>
+            <a:spLocks noGrp="1"/>
+          </p:cNvSpPr>
+          <p:nvPr>
+            <p:ph type="title"/>
+          </p:nvPr>
+        </p:nvSpPr>
+        <p:spPr/>
+        <p:txBody>
+          <a:bodyPr/>
+          <a:lstStyle/>
+          <a:p>
+            <a:r>
+              <a:rPr lang="en-US" dirty="0"/>
+              <a:t>Functional Requirements</a:t>
+            </a:r>
+          </a:p>
+        </p:txBody>
+      </p:sp>
+      <p:sp>
+        <p:nvSpPr>
+          <p:cNvPr id="3" name="Content Placeholder 2">
+            <a:extLst>
+              <a:ext uri="{FF2B5EF4-FFF2-40B4-BE49-F238E27FC236}">
+                <a16:creationId xmlns:a16="http://schemas.microsoft.com/office/drawing/2014/main" id="{9E3A2EED-B631-D83A-62D7-BE30F829F215}"/>
+              </a:ext>
+            </a:extLst>
+          </p:cNvPr>
+          <p:cNvSpPr>
+            <a:spLocks noGrp="1"/>
+          </p:cNvSpPr>
+          <p:nvPr>
+            <p:ph idx="1"/>
+          </p:nvPr>
+        </p:nvSpPr>
+        <p:spPr/>
+        <p:txBody>
+          <a:bodyPr/>
+          <a:lstStyle/>
+          <a:p>
+            <a:r>
+              <a:rPr lang="en-US" dirty="0"/>
+              <a:t>Alerting and notifying .</a:t>
+            </a:r>
+          </a:p>
+          <a:p>
+            <a:r>
+              <a:rPr lang="en-US" dirty="0"/>
+              <a:t>Real time data collection.</a:t>
+            </a:r>
+          </a:p>
+          <a:p>
+            <a:r>
+              <a:rPr lang="en-US" dirty="0"/>
+              <a:t>Remote monitoring.</a:t>
+            </a:r>
+          </a:p>
+        </p:txBody>
+      </p:sp>
+    </p:spTree>
+    <p:extLst>
+      <p:ext uri="{BB962C8B-B14F-4D97-AF65-F5344CB8AC3E}">
+        <p14:creationId xmlns:p14="http://schemas.microsoft.com/office/powerpoint/2010/main" val="2954950060"/>
+      </p:ext>
+    </p:extLst>
+  </p:cSld>
+  <p:clrMapOvr>
+    <a:masterClrMapping/>
+  </p:clrMapOvr>
+</p:sld>
+</file>
+
+<file path=ppt/slides/slide8.xml><?xml version="1.0" encoding="utf-8"?>
 <p:sld xmlns:a="http://schemas.openxmlformats.org/drawingml/2006/main" xmlns:r="http://schemas.openxmlformats.org/officeDocument/2006/relationships" xmlns:p="http://schemas.openxmlformats.org/presentationml/2006/main">
   <p:cSld>
     <p:spTree>

</xml_diff>

<commit_message>
After sending the data to the database
</commit_message>
<xml_diff>
--- a/Project Documents/IOT BRIDGE HEALTH MONITORING SYSTEM.pptx
+++ b/Project Documents/IOT BRIDGE HEALTH MONITORING SYSTEM.pptx
@@ -204,7 +204,7 @@
           <a:p>
             <a:fld id="{A5D95F22-66B1-4AF0-BFC7-A3C02BEF6C07}" type="datetimeFigureOut">
               <a:rPr lang="en-US" smtClean="0"/>
-              <a:t>5/16/2023</a:t>
+              <a:t>5/17/2023</a:t>
             </a:fld>
             <a:endParaRPr lang="en-US"/>
           </a:p>
@@ -922,28 +922,115 @@
           <a:p>
             <a:r>
               <a:rPr lang="en-US" dirty="0"/>
-              <a:t>For us to achieve our objective, we </a:t>
-            </a:r>
-            <a:r>
-              <a:rPr lang="en-US"/>
-              <a:t>have microcontroller  </a:t>
-            </a:r>
-            <a:r>
-              <a:rPr lang="en-US" dirty="0"/>
-              <a:t>ESP8266  for the programming logic.</a:t>
-            </a:r>
-          </a:p>
-          <a:p>
-            <a:r>
-              <a:rPr lang="en-US" dirty="0"/>
-              <a:t>#add sensor data</a:t>
-            </a:r>
-          </a:p>
-          <a:p>
-            <a:r>
-              <a:rPr lang="en-US" dirty="0"/>
-              <a:t>When we gather data from the sensors, our microcontroller will send data to be displayed  on lcd and dashboard. It will also send instructions to the servo motor to close or open the road </a:t>
-            </a:r>
+              <a:t>For</a:t>
+            </a:r>
+            <a:r>
+              <a:rPr lang="en-US" baseline="0" dirty="0"/>
+              <a:t> us to achieve this objective, we have microcontroller ESP8266 for the programming logic</a:t>
+            </a:r>
+          </a:p>
+          <a:p>
+            <a:endParaRPr lang="en-US" baseline="0" dirty="0"/>
+          </a:p>
+          <a:p>
+            <a:r>
+              <a:rPr lang="en-US" baseline="0" dirty="0"/>
+              <a:t>So, we have sensors that will be used to get data</a:t>
+            </a:r>
+          </a:p>
+          <a:p>
+            <a:pPr marL="228600" indent="-228600">
+              <a:buAutoNum type="arabicPeriod"/>
+            </a:pPr>
+            <a:r>
+              <a:rPr lang="en-US" baseline="0" dirty="0"/>
+              <a:t>Vibration sensor 	: measuring vibrations in bridges</a:t>
+            </a:r>
+          </a:p>
+          <a:p>
+            <a:pPr marL="228600" indent="-228600">
+              <a:buAutoNum type="arabicPeriod"/>
+            </a:pPr>
+            <a:r>
+              <a:rPr lang="en-US" baseline="0" dirty="0" err="1"/>
+              <a:t>Soghe</a:t>
+            </a:r>
+            <a:r>
+              <a:rPr lang="en-US" baseline="0" dirty="0"/>
+              <a:t> water sensor 	: this is for indicating water level</a:t>
+            </a:r>
+          </a:p>
+          <a:p>
+            <a:pPr marL="228600" indent="-228600">
+              <a:buAutoNum type="arabicPeriod"/>
+            </a:pPr>
+            <a:r>
+              <a:rPr lang="en-US" baseline="0" dirty="0"/>
+              <a:t>Ultrasonic sensor	: for detecting cracks in bridges</a:t>
+            </a:r>
+          </a:p>
+          <a:p>
+            <a:pPr marL="228600" indent="-228600">
+              <a:buAutoNum type="arabicPeriod"/>
+            </a:pPr>
+            <a:r>
+              <a:rPr lang="en-US" baseline="0" dirty="0"/>
+              <a:t>Load cell		: for sensing strain </a:t>
+            </a:r>
+          </a:p>
+          <a:p>
+            <a:pPr marL="0" indent="0">
+              <a:buNone/>
+            </a:pPr>
+            <a:r>
+              <a:rPr lang="en-US" baseline="0" dirty="0"/>
+              <a:t>5. Accelerometer                     : for tilt sensing </a:t>
+            </a:r>
+          </a:p>
+          <a:p>
+            <a:pPr marL="0" indent="0">
+              <a:buNone/>
+            </a:pPr>
+            <a:endParaRPr lang="en-US" baseline="0" dirty="0"/>
+          </a:p>
+          <a:p>
+            <a:pPr marL="0" indent="0">
+              <a:buNone/>
+            </a:pPr>
+            <a:r>
+              <a:rPr lang="en-US" baseline="0" dirty="0"/>
+              <a:t>Other tools </a:t>
+            </a:r>
+          </a:p>
+          <a:p>
+            <a:pPr marL="0" indent="0">
+              <a:buNone/>
+            </a:pPr>
+            <a:r>
+              <a:rPr lang="en-US" baseline="0" dirty="0"/>
+              <a:t>Servo motor 		:  for closing or opening the road depending on the data coming from ESP8266</a:t>
+            </a:r>
+          </a:p>
+          <a:p>
+            <a:pPr marL="0" indent="0">
+              <a:buNone/>
+            </a:pPr>
+            <a:r>
+              <a:rPr lang="en-US" baseline="0" dirty="0"/>
+              <a:t>Monitor system 	:  the dashboard</a:t>
+            </a:r>
+          </a:p>
+          <a:p>
+            <a:pPr marL="0" indent="0">
+              <a:buNone/>
+            </a:pPr>
+            <a:r>
+              <a:rPr lang="en-US" baseline="0" dirty="0"/>
+              <a:t>LCD		:</a:t>
+            </a:r>
+          </a:p>
+          <a:p>
+            <a:endParaRPr lang="en-US" dirty="0"/>
           </a:p>
         </p:txBody>
       </p:sp>
@@ -1214,7 +1301,7 @@
           <a:p>
             <a:fld id="{DC56E06E-BEA2-4DD1-80C0-67F9D1558EE0}" type="datetimeFigureOut">
               <a:rPr lang="en-US" smtClean="0"/>
-              <a:t>5/16/2023</a:t>
+              <a:t>5/17/2023</a:t>
             </a:fld>
             <a:endParaRPr lang="en-US"/>
           </a:p>
@@ -1412,7 +1499,7 @@
           <a:p>
             <a:fld id="{DC56E06E-BEA2-4DD1-80C0-67F9D1558EE0}" type="datetimeFigureOut">
               <a:rPr lang="en-US" smtClean="0"/>
-              <a:t>5/16/2023</a:t>
+              <a:t>5/17/2023</a:t>
             </a:fld>
             <a:endParaRPr lang="en-US"/>
           </a:p>
@@ -1620,7 +1707,7 @@
           <a:p>
             <a:fld id="{DC56E06E-BEA2-4DD1-80C0-67F9D1558EE0}" type="datetimeFigureOut">
               <a:rPr lang="en-US" smtClean="0"/>
-              <a:t>5/16/2023</a:t>
+              <a:t>5/17/2023</a:t>
             </a:fld>
             <a:endParaRPr lang="en-US"/>
           </a:p>
@@ -1818,7 +1905,7 @@
           <a:p>
             <a:fld id="{DC56E06E-BEA2-4DD1-80C0-67F9D1558EE0}" type="datetimeFigureOut">
               <a:rPr lang="en-US" smtClean="0"/>
-              <a:t>5/16/2023</a:t>
+              <a:t>5/17/2023</a:t>
             </a:fld>
             <a:endParaRPr lang="en-US"/>
           </a:p>
@@ -2093,7 +2180,7 @@
           <a:p>
             <a:fld id="{DC56E06E-BEA2-4DD1-80C0-67F9D1558EE0}" type="datetimeFigureOut">
               <a:rPr lang="en-US" smtClean="0"/>
-              <a:t>5/16/2023</a:t>
+              <a:t>5/17/2023</a:t>
             </a:fld>
             <a:endParaRPr lang="en-US"/>
           </a:p>
@@ -2358,7 +2445,7 @@
           <a:p>
             <a:fld id="{DC56E06E-BEA2-4DD1-80C0-67F9D1558EE0}" type="datetimeFigureOut">
               <a:rPr lang="en-US" smtClean="0"/>
-              <a:t>5/16/2023</a:t>
+              <a:t>5/17/2023</a:t>
             </a:fld>
             <a:endParaRPr lang="en-US"/>
           </a:p>
@@ -2770,7 +2857,7 @@
           <a:p>
             <a:fld id="{DC56E06E-BEA2-4DD1-80C0-67F9D1558EE0}" type="datetimeFigureOut">
               <a:rPr lang="en-US" smtClean="0"/>
-              <a:t>5/16/2023</a:t>
+              <a:t>5/17/2023</a:t>
             </a:fld>
             <a:endParaRPr lang="en-US"/>
           </a:p>
@@ -2911,7 +2998,7 @@
           <a:p>
             <a:fld id="{DC56E06E-BEA2-4DD1-80C0-67F9D1558EE0}" type="datetimeFigureOut">
               <a:rPr lang="en-US" smtClean="0"/>
-              <a:t>5/16/2023</a:t>
+              <a:t>5/17/2023</a:t>
             </a:fld>
             <a:endParaRPr lang="en-US"/>
           </a:p>
@@ -3024,7 +3111,7 @@
           <a:p>
             <a:fld id="{DC56E06E-BEA2-4DD1-80C0-67F9D1558EE0}" type="datetimeFigureOut">
               <a:rPr lang="en-US" smtClean="0"/>
-              <a:t>5/16/2023</a:t>
+              <a:t>5/17/2023</a:t>
             </a:fld>
             <a:endParaRPr lang="en-US"/>
           </a:p>
@@ -3335,7 +3422,7 @@
           <a:p>
             <a:fld id="{DC56E06E-BEA2-4DD1-80C0-67F9D1558EE0}" type="datetimeFigureOut">
               <a:rPr lang="en-US" smtClean="0"/>
-              <a:t>5/16/2023</a:t>
+              <a:t>5/17/2023</a:t>
             </a:fld>
             <a:endParaRPr lang="en-US"/>
           </a:p>
@@ -3623,7 +3710,7 @@
           <a:p>
             <a:fld id="{DC56E06E-BEA2-4DD1-80C0-67F9D1558EE0}" type="datetimeFigureOut">
               <a:rPr lang="en-US" smtClean="0"/>
-              <a:t>5/16/2023</a:t>
+              <a:t>5/17/2023</a:t>
             </a:fld>
             <a:endParaRPr lang="en-US"/>
           </a:p>
@@ -3864,7 +3951,7 @@
           <a:p>
             <a:fld id="{DC56E06E-BEA2-4DD1-80C0-67F9D1558EE0}" type="datetimeFigureOut">
               <a:rPr lang="en-US" smtClean="0"/>
-              <a:t>5/16/2023</a:t>
+              <a:t>5/17/2023</a:t>
             </a:fld>
             <a:endParaRPr lang="en-US"/>
           </a:p>
@@ -4918,7 +5005,13 @@
       </p:sp>
       <p:pic>
         <p:nvPicPr>
-          <p:cNvPr id="4" name="Content Placeholder 3"/>
+          <p:cNvPr id="7" name="Content Placeholder 6">
+            <a:extLst>
+              <a:ext uri="{FF2B5EF4-FFF2-40B4-BE49-F238E27FC236}">
+                <a16:creationId xmlns:a16="http://schemas.microsoft.com/office/drawing/2014/main" id="{F5B8603A-60AE-36E0-A7A5-CDD78304F4CE}"/>
+              </a:ext>
+            </a:extLst>
+          </p:cNvPr>
           <p:cNvPicPr>
             <a:picLocks noGrp="1" noChangeAspect="1"/>
           </p:cNvPicPr>
@@ -4940,8 +5033,8 @@
         </p:blipFill>
         <p:spPr>
           <a:xfrm>
-            <a:off x="1518036" y="1456267"/>
-            <a:ext cx="8556978" cy="5305777"/>
+            <a:off x="1155940" y="1690688"/>
+            <a:ext cx="8574655" cy="5167312"/>
           </a:xfrm>
         </p:spPr>
       </p:pic>
@@ -5117,7 +5210,7 @@
             </a:pPr>
             <a:r>
               <a:rPr lang="en-IN" b="1" dirty="0"/>
-              <a:t> HARDWARE REQUIREMENTS</a:t>
+              <a:t> HARDWARE </a:t>
             </a:r>
             <a:endParaRPr lang="en-US" sz="2000" dirty="0"/>
           </a:p>
@@ -5165,7 +5258,59 @@
             <a:pPr marL="0" indent="0">
               <a:buNone/>
             </a:pPr>
-            <a:endParaRPr lang="en-US" dirty="0"/>
+            <a:r>
+              <a:rPr lang="en-US" dirty="0"/>
+              <a:t>  </a:t>
+            </a:r>
+            <a:r>
+              <a:rPr lang="en-IN" b="1" dirty="0"/>
+              <a:t>SOFTWARE</a:t>
+            </a:r>
+          </a:p>
+          <a:p>
+            <a:pPr lvl="2"/>
+            <a:r>
+              <a:rPr lang="en-IN" sz="1600" b="1" dirty="0"/>
+              <a:t> </a:t>
+            </a:r>
+            <a:r>
+              <a:rPr lang="en-IN" sz="1600" dirty="0" err="1"/>
+              <a:t>thinkspeak</a:t>
+            </a:r>
+            <a:r>
+              <a:rPr lang="en-IN" sz="1600" dirty="0"/>
+              <a:t> </a:t>
+            </a:r>
+          </a:p>
+          <a:p>
+            <a:pPr lvl="2"/>
+            <a:r>
+              <a:rPr lang="en-IN" sz="1600" dirty="0"/>
+              <a:t>PHP</a:t>
+            </a:r>
+          </a:p>
+          <a:p>
+            <a:pPr lvl="2"/>
+            <a:r>
+              <a:rPr lang="en-IN" sz="1600" dirty="0"/>
+              <a:t>MYSQL</a:t>
+            </a:r>
+          </a:p>
+          <a:p>
+            <a:pPr lvl="2"/>
+            <a:r>
+              <a:rPr lang="en-IN" sz="1600" dirty="0" err="1"/>
+              <a:t>Javascript</a:t>
+            </a:r>
+            <a:endParaRPr lang="en-IN" sz="1600" dirty="0"/>
+          </a:p>
+          <a:p>
+            <a:pPr lvl="2"/>
+            <a:r>
+              <a:rPr lang="en-IN" sz="1600" dirty="0"/>
+              <a:t>bootstrap</a:t>
+            </a:r>
+            <a:endParaRPr lang="en-US" sz="1600" dirty="0"/>
           </a:p>
         </p:txBody>
       </p:sp>

</xml_diff>